<commit_message>
Removed wrong problem from slides for "05.1. Methods - Basics"
</commit_message>
<xml_diff>
--- a/Courses/Software-Sciences/Module-1-OOP-New/05.1-Methods-Basics/05.1-Methods-Basics.pptx
+++ b/Courses/Software-Sciences/Module-1-OOP-New/05.1-Methods-Basics/05.1-Methods-Basics.pptx
@@ -5,10 +5,10 @@
     <p:sldMasterId id="2147483675" r:id="rId1"/>
   </p:sldMasterIdLst>
   <p:notesMasterIdLst>
-    <p:notesMasterId r:id="rId36"/>
+    <p:notesMasterId r:id="rId33"/>
   </p:notesMasterIdLst>
   <p:handoutMasterIdLst>
-    <p:handoutMasterId r:id="rId37"/>
+    <p:handoutMasterId r:id="rId34"/>
   </p:handoutMasterIdLst>
   <p:sldIdLst>
     <p:sldId id="528" r:id="rId2"/>
@@ -32,19 +32,16 @@
     <p:sldId id="488" r:id="rId20"/>
     <p:sldId id="492" r:id="rId21"/>
     <p:sldId id="548" r:id="rId22"/>
-    <p:sldId id="551" r:id="rId23"/>
-    <p:sldId id="553" r:id="rId24"/>
-    <p:sldId id="552" r:id="rId25"/>
-    <p:sldId id="500" r:id="rId26"/>
-    <p:sldId id="501" r:id="rId27"/>
-    <p:sldId id="509" r:id="rId28"/>
-    <p:sldId id="510" r:id="rId29"/>
-    <p:sldId id="511" r:id="rId30"/>
-    <p:sldId id="512" r:id="rId31"/>
-    <p:sldId id="589" r:id="rId32"/>
-    <p:sldId id="534" r:id="rId33"/>
-    <p:sldId id="401" r:id="rId34"/>
-    <p:sldId id="587" r:id="rId35"/>
+    <p:sldId id="500" r:id="rId23"/>
+    <p:sldId id="501" r:id="rId24"/>
+    <p:sldId id="509" r:id="rId25"/>
+    <p:sldId id="510" r:id="rId26"/>
+    <p:sldId id="511" r:id="rId27"/>
+    <p:sldId id="512" r:id="rId28"/>
+    <p:sldId id="589" r:id="rId29"/>
+    <p:sldId id="534" r:id="rId30"/>
+    <p:sldId id="401" r:id="rId31"/>
+    <p:sldId id="587" r:id="rId32"/>
   </p:sldIdLst>
   <p:sldSz cx="12192000" cy="6858000"/>
   <p:notesSz cx="6858000" cy="9144000"/>
@@ -185,9 +182,6 @@
             <p14:sldId id="488"/>
             <p14:sldId id="492"/>
             <p14:sldId id="548"/>
-            <p14:sldId id="551"/>
-            <p14:sldId id="553"/>
-            <p14:sldId id="552"/>
           </p14:sldIdLst>
         </p14:section>
         <p14:section name="Ред на изпълнение в програмата" id="{172491D3-CC80-44C5-BDE8-DAFCA2406F2E}">
@@ -1143,7 +1137,7 @@
             <a:fld id="{3EBA5BD7-F043-4D1B-AA17-CD412FC534DE}" type="slidenum">
               <a:rPr lang="en-US" smtClean="0"/>
               <a:pPr/>
-              <a:t>25</a:t>
+              <a:t>22</a:t>
             </a:fld>
             <a:endParaRPr lang="en-US" dirty="0"/>
           </a:p>
@@ -1277,7 +1271,7 @@
           <a:p>
             <a:fld id="{2BF067CD-8E6B-4360-9AA8-C5DF2A48A6D1}" type="slidenum">
               <a:rPr lang="en-US" smtClean="0"/>
-              <a:t>26</a:t>
+              <a:t>23</a:t>
             </a:fld>
             <a:endParaRPr lang="en-US" dirty="0"/>
           </a:p>
@@ -1395,7 +1389,7 @@
             <a:fld id="{3EBA5BD7-F043-4D1B-AA17-CD412FC534DE}" type="slidenum">
               <a:rPr lang="en-US" smtClean="0"/>
               <a:pPr/>
-              <a:t>32</a:t>
+              <a:t>29</a:t>
             </a:fld>
             <a:endParaRPr lang="en-US" dirty="0"/>
           </a:p>
@@ -1636,7 +1630,7 @@
             <a:fld id="{3EBA5BD7-F043-4D1B-AA17-CD412FC534DE}" type="slidenum">
               <a:rPr lang="en-US" smtClean="0"/>
               <a:pPr/>
-              <a:t>33</a:t>
+              <a:t>30</a:t>
             </a:fld>
             <a:endParaRPr lang="en-US" dirty="0"/>
           </a:p>
@@ -1877,7 +1871,7 @@
             <a:fld id="{3EBA5BD7-F043-4D1B-AA17-CD412FC534DE}" type="slidenum">
               <a:rPr lang="en-US" smtClean="0"/>
               <a:pPr/>
-              <a:t>34</a:t>
+              <a:t>31</a:t>
             </a:fld>
             <a:endParaRPr lang="en-US" dirty="0"/>
           </a:p>
@@ -22812,2375 +22806,6 @@
           <a:chExt cx="0" cy="0"/>
         </a:xfrm>
       </p:grpSpPr>
-      <p:sp>
-        <p:nvSpPr>
-          <p:cNvPr id="2" name="Text Placeholder 1"/>
-          <p:cNvSpPr>
-            <a:spLocks noGrp="1"/>
-          </p:cNvSpPr>
-          <p:nvPr>
-            <p:ph type="body" sz="quarter" idx="10"/>
-          </p:nvPr>
-        </p:nvSpPr>
-        <p:spPr/>
-        <p:txBody>
-          <a:bodyPr/>
-          <a:lstStyle/>
-          <a:p>
-            <a:r>
-              <a:rPr lang="bg-BG" dirty="0"/>
-              <a:t>Напишете метод, който получава </a:t>
-            </a:r>
-            <a:r>
-              <a:rPr lang="bg-BG" b="1" dirty="0">
-                <a:solidFill>
-                  <a:schemeClr val="bg1"/>
-                </a:solidFill>
-              </a:rPr>
-              <a:t>стринг</a:t>
-            </a:r>
-            <a:r>
-              <a:rPr lang="en-US" dirty="0"/>
-              <a:t> </a:t>
-            </a:r>
-            <a:r>
-              <a:rPr lang="bg-BG" dirty="0"/>
-              <a:t>и</a:t>
-            </a:r>
-            <a:r>
-              <a:rPr lang="en-US" dirty="0"/>
-              <a:t> </a:t>
-            </a:r>
-            <a:r>
-              <a:rPr lang="bg-BG" dirty="0"/>
-              <a:t>цяло число </a:t>
-            </a:r>
-            <a:r>
-              <a:rPr lang="en-US" b="1" dirty="0">
-                <a:solidFill>
-                  <a:schemeClr val="bg1"/>
-                </a:solidFill>
-              </a:rPr>
-              <a:t>n</a:t>
-            </a:r>
-            <a:r>
-              <a:rPr lang="bg-BG" dirty="0"/>
-              <a:t>, което означава </a:t>
-            </a:r>
-            <a:r>
-              <a:rPr lang="bg-BG" b="1" dirty="0">
-                <a:solidFill>
-                  <a:schemeClr val="bg1"/>
-                </a:solidFill>
-              </a:rPr>
-              <a:t>броя</a:t>
-            </a:r>
-            <a:r>
-              <a:rPr lang="bg-BG" dirty="0"/>
-              <a:t> </a:t>
-            </a:r>
-            <a:r>
-              <a:rPr lang="bg-BG" b="1" dirty="0">
-                <a:solidFill>
-                  <a:schemeClr val="bg1"/>
-                </a:solidFill>
-              </a:rPr>
-              <a:t>повторения</a:t>
-            </a:r>
-            <a:endParaRPr lang="en-US" b="1" dirty="0">
-              <a:solidFill>
-                <a:schemeClr val="bg1"/>
-              </a:solidFill>
-            </a:endParaRPr>
-          </a:p>
-          <a:p>
-            <a:pPr lvl="1"/>
-            <a:r>
-              <a:rPr lang="bg-BG" dirty="0"/>
-              <a:t>Методът трябва да връща </a:t>
-            </a:r>
-            <a:r>
-              <a:rPr lang="bg-BG" b="1" dirty="0">
-                <a:solidFill>
-                  <a:schemeClr val="bg1"/>
-                </a:solidFill>
-              </a:rPr>
-              <a:t>нов стринг</a:t>
-            </a:r>
-            <a:r>
-              <a:rPr lang="en-US" dirty="0"/>
-              <a:t>, </a:t>
-            </a:r>
-            <a:r>
-              <a:rPr lang="bg-BG" dirty="0"/>
-              <a:t>който представлява </a:t>
-            </a:r>
-            <a:r>
-              <a:rPr lang="bg-BG" b="1" dirty="0">
-                <a:solidFill>
-                  <a:schemeClr val="bg1"/>
-                </a:solidFill>
-              </a:rPr>
-              <a:t>въведения стринг</a:t>
-            </a:r>
-            <a:r>
-              <a:rPr lang="en-US" dirty="0"/>
-              <a:t>, </a:t>
-            </a:r>
-            <a:r>
-              <a:rPr lang="bg-BG" dirty="0"/>
-              <a:t>повторен</a:t>
-            </a:r>
-            <a:r>
-              <a:rPr lang="en-US" dirty="0"/>
-              <a:t> </a:t>
-            </a:r>
-            <a:r>
-              <a:rPr lang="en-US" b="1" dirty="0">
-                <a:solidFill>
-                  <a:schemeClr val="bg1"/>
-                </a:solidFill>
-              </a:rPr>
-              <a:t>n </a:t>
-            </a:r>
-            <a:r>
-              <a:rPr lang="bg-BG" b="1" dirty="0">
-                <a:solidFill>
-                  <a:schemeClr val="bg1"/>
-                </a:solidFill>
-              </a:rPr>
-              <a:t>пъти</a:t>
-            </a:r>
-          </a:p>
-        </p:txBody>
-      </p:sp>
-      <p:sp>
-        <p:nvSpPr>
-          <p:cNvPr id="3" name="Title 2"/>
-          <p:cNvSpPr>
-            <a:spLocks noGrp="1"/>
-          </p:cNvSpPr>
-          <p:nvPr>
-            <p:ph type="title"/>
-          </p:nvPr>
-        </p:nvSpPr>
-        <p:spPr/>
-        <p:txBody>
-          <a:bodyPr/>
-          <a:lstStyle/>
-          <a:p>
-            <a:r>
-              <a:rPr lang="bg-BG" dirty="0"/>
-              <a:t>Задача:</a:t>
-            </a:r>
-            <a:r>
-              <a:rPr lang="en-US" dirty="0"/>
-              <a:t> </a:t>
-            </a:r>
-            <a:r>
-              <a:rPr lang="bg-BG" dirty="0"/>
-              <a:t>Повторение на стринг</a:t>
-            </a:r>
-          </a:p>
-        </p:txBody>
-      </p:sp>
-      <p:sp>
-        <p:nvSpPr>
-          <p:cNvPr id="5" name="Rectangle 4">
-            <a:extLst>
-              <a:ext uri="{FF2B5EF4-FFF2-40B4-BE49-F238E27FC236}">
-                <a16:creationId xmlns:a16="http://schemas.microsoft.com/office/drawing/2014/main" id="{8BE948D6-42C3-4447-8FC2-55BCA526CCC8}"/>
-              </a:ext>
-            </a:extLst>
-          </p:cNvPr>
-          <p:cNvSpPr>
-            <a:spLocks noChangeArrowheads="1"/>
-          </p:cNvSpPr>
-          <p:nvPr/>
-        </p:nvSpPr>
-        <p:spPr bwMode="auto">
-          <a:xfrm>
-            <a:off x="2901000" y="3884837"/>
-            <a:ext cx="1559764" cy="1076937"/>
-          </a:xfrm>
-          <a:prstGeom prst="rect">
-            <a:avLst/>
-          </a:prstGeom>
-          <a:solidFill>
-            <a:schemeClr val="accent5">
-              <a:lumMod val="40000"/>
-              <a:lumOff val="60000"/>
-              <a:alpha val="20000"/>
-            </a:schemeClr>
-          </a:solidFill>
-          <a:ln w="12700">
-            <a:solidFill>
-              <a:schemeClr val="accent5">
-                <a:lumMod val="60000"/>
-                <a:lumOff val="40000"/>
-              </a:schemeClr>
-            </a:solidFill>
-          </a:ln>
-        </p:spPr>
-        <p:txBody>
-          <a:bodyPr wrap="square">
-            <a:spAutoFit/>
-          </a:bodyPr>
-          <a:lstStyle/>
-          <a:p>
-            <a:pPr algn="ctr" eaLnBrk="0" hangingPunct="0">
-              <a:buClr>
-                <a:schemeClr val="accent5">
-                  <a:lumMod val="40000"/>
-                  <a:lumOff val="60000"/>
-                </a:schemeClr>
-              </a:buClr>
-              <a:buSzPct val="70000"/>
-            </a:pPr>
-            <a:r>
-              <a:rPr lang="it-IT" sz="3199" b="1" noProof="1">
-                <a:latin typeface="Consolas" panose="020B0609020204030204" pitchFamily="49" charset="0"/>
-              </a:rPr>
-              <a:t>abc</a:t>
-            </a:r>
-          </a:p>
-          <a:p>
-            <a:pPr algn="ctr" eaLnBrk="0" hangingPunct="0">
-              <a:buClr>
-                <a:schemeClr val="accent5">
-                  <a:lumMod val="40000"/>
-                  <a:lumOff val="60000"/>
-                </a:schemeClr>
-              </a:buClr>
-              <a:buSzPct val="70000"/>
-            </a:pPr>
-            <a:r>
-              <a:rPr lang="it-IT" sz="3199" b="1" noProof="1">
-                <a:latin typeface="Consolas" panose="020B0609020204030204" pitchFamily="49" charset="0"/>
-              </a:rPr>
-              <a:t>3</a:t>
-            </a:r>
-          </a:p>
-        </p:txBody>
-      </p:sp>
-      <p:sp>
-        <p:nvSpPr>
-          <p:cNvPr id="6" name="Rectangle 5">
-            <a:extLst>
-              <a:ext uri="{FF2B5EF4-FFF2-40B4-BE49-F238E27FC236}">
-                <a16:creationId xmlns:a16="http://schemas.microsoft.com/office/drawing/2014/main" id="{92362A31-5F40-431D-B4B7-51175EEE543B}"/>
-              </a:ext>
-            </a:extLst>
-          </p:cNvPr>
-          <p:cNvSpPr>
-            <a:spLocks noChangeArrowheads="1"/>
-          </p:cNvSpPr>
-          <p:nvPr/>
-        </p:nvSpPr>
-        <p:spPr bwMode="auto">
-          <a:xfrm>
-            <a:off x="5618088" y="4161482"/>
-            <a:ext cx="2920244" cy="584623"/>
-          </a:xfrm>
-          <a:prstGeom prst="rect">
-            <a:avLst/>
-          </a:prstGeom>
-          <a:solidFill>
-            <a:schemeClr val="accent5">
-              <a:lumMod val="40000"/>
-              <a:lumOff val="60000"/>
-              <a:alpha val="20000"/>
-            </a:schemeClr>
-          </a:solidFill>
-          <a:ln w="12700">
-            <a:solidFill>
-              <a:schemeClr val="accent5">
-                <a:lumMod val="60000"/>
-                <a:lumOff val="40000"/>
-              </a:schemeClr>
-            </a:solidFill>
-          </a:ln>
-        </p:spPr>
-        <p:txBody>
-          <a:bodyPr wrap="square">
-            <a:spAutoFit/>
-          </a:bodyPr>
-          <a:lstStyle/>
-          <a:p>
-            <a:pPr algn="ctr" eaLnBrk="0" hangingPunct="0">
-              <a:buClr>
-                <a:schemeClr val="accent5">
-                  <a:lumMod val="40000"/>
-                  <a:lumOff val="60000"/>
-                </a:schemeClr>
-              </a:buClr>
-              <a:buSzPct val="70000"/>
-            </a:pPr>
-            <a:r>
-              <a:rPr lang="en-GB" sz="3199" b="1" noProof="1">
-                <a:latin typeface="Consolas" panose="020B0609020204030204" pitchFamily="49" charset="0"/>
-              </a:rPr>
-              <a:t>abcabcabc</a:t>
-            </a:r>
-            <a:endParaRPr lang="it-IT" sz="3199" b="1" noProof="1">
-              <a:latin typeface="Consolas" panose="020B0609020204030204" pitchFamily="49" charset="0"/>
-            </a:endParaRPr>
-          </a:p>
-        </p:txBody>
-      </p:sp>
-      <p:sp>
-        <p:nvSpPr>
-          <p:cNvPr id="7" name="Rectangle 6">
-            <a:extLst>
-              <a:ext uri="{FF2B5EF4-FFF2-40B4-BE49-F238E27FC236}">
-                <a16:creationId xmlns:a16="http://schemas.microsoft.com/office/drawing/2014/main" id="{41F4524D-D92D-4B11-9E95-3DF692E099EE}"/>
-              </a:ext>
-            </a:extLst>
-          </p:cNvPr>
-          <p:cNvSpPr>
-            <a:spLocks noChangeArrowheads="1"/>
-          </p:cNvSpPr>
-          <p:nvPr/>
-        </p:nvSpPr>
-        <p:spPr bwMode="auto">
-          <a:xfrm>
-            <a:off x="2900999" y="5433872"/>
-            <a:ext cx="1559764" cy="1076937"/>
-          </a:xfrm>
-          <a:prstGeom prst="rect">
-            <a:avLst/>
-          </a:prstGeom>
-          <a:solidFill>
-            <a:schemeClr val="accent5">
-              <a:lumMod val="40000"/>
-              <a:lumOff val="60000"/>
-              <a:alpha val="20000"/>
-            </a:schemeClr>
-          </a:solidFill>
-          <a:ln w="12700">
-            <a:solidFill>
-              <a:schemeClr val="accent5">
-                <a:lumMod val="60000"/>
-                <a:lumOff val="40000"/>
-              </a:schemeClr>
-            </a:solidFill>
-          </a:ln>
-        </p:spPr>
-        <p:txBody>
-          <a:bodyPr wrap="square">
-            <a:spAutoFit/>
-          </a:bodyPr>
-          <a:lstStyle/>
-          <a:p>
-            <a:pPr algn="ctr" eaLnBrk="0" hangingPunct="0">
-              <a:buClr>
-                <a:schemeClr val="accent5">
-                  <a:lumMod val="40000"/>
-                  <a:lumOff val="60000"/>
-                </a:schemeClr>
-              </a:buClr>
-              <a:buSzPct val="70000"/>
-            </a:pPr>
-            <a:r>
-              <a:rPr lang="it-IT" sz="3199" b="1" noProof="1">
-                <a:latin typeface="Consolas" panose="020B0609020204030204" pitchFamily="49" charset="0"/>
-              </a:rPr>
-              <a:t>String</a:t>
-            </a:r>
-          </a:p>
-          <a:p>
-            <a:pPr algn="ctr" eaLnBrk="0" hangingPunct="0">
-              <a:buClr>
-                <a:schemeClr val="accent5">
-                  <a:lumMod val="40000"/>
-                  <a:lumOff val="60000"/>
-                </a:schemeClr>
-              </a:buClr>
-              <a:buSzPct val="70000"/>
-            </a:pPr>
-            <a:r>
-              <a:rPr lang="it-IT" sz="3199" b="1" noProof="1">
-                <a:latin typeface="Consolas" panose="020B0609020204030204" pitchFamily="49" charset="0"/>
-              </a:rPr>
-              <a:t>2</a:t>
-            </a:r>
-          </a:p>
-        </p:txBody>
-      </p:sp>
-      <p:sp>
-        <p:nvSpPr>
-          <p:cNvPr id="8" name="Right Arrow 14">
-            <a:extLst>
-              <a:ext uri="{FF2B5EF4-FFF2-40B4-BE49-F238E27FC236}">
-                <a16:creationId xmlns:a16="http://schemas.microsoft.com/office/drawing/2014/main" id="{78273AC2-D375-47B5-88FD-7988BC3E468D}"/>
-              </a:ext>
-            </a:extLst>
-          </p:cNvPr>
-          <p:cNvSpPr/>
-          <p:nvPr/>
-        </p:nvSpPr>
-        <p:spPr>
-          <a:xfrm flipV="1">
-            <a:off x="4791318" y="5734906"/>
-            <a:ext cx="496215" cy="385646"/>
-          </a:xfrm>
-          <a:prstGeom prst="rightArrow">
-            <a:avLst/>
-          </a:prstGeom>
-          <a:solidFill>
-            <a:schemeClr val="dk2">
-              <a:alpha val="80000"/>
-            </a:schemeClr>
-          </a:solidFill>
-          <a:ln w="19050">
-            <a:solidFill>
-              <a:schemeClr val="tx1">
-                <a:lumMod val="75000"/>
-                <a:alpha val="80000"/>
-              </a:schemeClr>
-            </a:solidFill>
-          </a:ln>
-          <a:effectLst/>
-        </p:spPr>
-        <p:style>
-          <a:lnRef idx="2">
-            <a:schemeClr val="accent1">
-              <a:shade val="50000"/>
-            </a:schemeClr>
-          </a:lnRef>
-          <a:fillRef idx="1001">
-            <a:schemeClr val="dk2"/>
-          </a:fillRef>
-          <a:effectRef idx="0">
-            <a:schemeClr val="accent1"/>
-          </a:effectRef>
-          <a:fontRef idx="minor">
-            <a:schemeClr val="lt1"/>
-          </a:fontRef>
-        </p:style>
-        <p:txBody>
-          <a:bodyPr rot="0" spcFirstLastPara="0" vertOverflow="overflow" horzOverflow="overflow" vert="horz" wrap="square" lIns="91416" tIns="45708" rIns="91416" bIns="45708" numCol="1" spcCol="0" rtlCol="0" fromWordArt="0" anchor="ctr" anchorCtr="0" forceAA="0" compatLnSpc="1">
-            <a:prstTxWarp prst="textNoShape">
-              <a:avLst/>
-            </a:prstTxWarp>
-            <a:noAutofit/>
-          </a:bodyPr>
-          <a:lstStyle/>
-          <a:p>
-            <a:pPr algn="ctr"/>
-            <a:endParaRPr lang="en-US" sz="2799" b="1">
-              <a:solidFill>
-                <a:srgbClr val="FFFFFF"/>
-              </a:solidFill>
-              <a:effectLst>
-                <a:outerShdw blurRad="38100" dist="38100" dir="2700000" algn="tl">
-                  <a:srgbClr val="000000">
-                    <a:alpha val="43137"/>
-                  </a:srgbClr>
-                </a:outerShdw>
-              </a:effectLst>
-            </a:endParaRPr>
-          </a:p>
-        </p:txBody>
-      </p:sp>
-      <p:sp>
-        <p:nvSpPr>
-          <p:cNvPr id="9" name="Rectangle 8">
-            <a:extLst>
-              <a:ext uri="{FF2B5EF4-FFF2-40B4-BE49-F238E27FC236}">
-                <a16:creationId xmlns:a16="http://schemas.microsoft.com/office/drawing/2014/main" id="{A166E673-B46E-4055-8829-58904C81C524}"/>
-              </a:ext>
-            </a:extLst>
-          </p:cNvPr>
-          <p:cNvSpPr>
-            <a:spLocks noChangeArrowheads="1"/>
-          </p:cNvSpPr>
-          <p:nvPr/>
-        </p:nvSpPr>
-        <p:spPr bwMode="auto">
-          <a:xfrm>
-            <a:off x="5618088" y="5635420"/>
-            <a:ext cx="2920244" cy="584623"/>
-          </a:xfrm>
-          <a:prstGeom prst="rect">
-            <a:avLst/>
-          </a:prstGeom>
-          <a:solidFill>
-            <a:schemeClr val="accent5">
-              <a:lumMod val="40000"/>
-              <a:lumOff val="60000"/>
-              <a:alpha val="20000"/>
-            </a:schemeClr>
-          </a:solidFill>
-          <a:ln w="12700">
-            <a:solidFill>
-              <a:schemeClr val="accent5">
-                <a:lumMod val="60000"/>
-                <a:lumOff val="40000"/>
-              </a:schemeClr>
-            </a:solidFill>
-          </a:ln>
-        </p:spPr>
-        <p:txBody>
-          <a:bodyPr wrap="square">
-            <a:spAutoFit/>
-          </a:bodyPr>
-          <a:lstStyle/>
-          <a:p>
-            <a:pPr algn="ctr" eaLnBrk="0" hangingPunct="0">
-              <a:buClr>
-                <a:schemeClr val="accent5">
-                  <a:lumMod val="40000"/>
-                  <a:lumOff val="60000"/>
-                </a:schemeClr>
-              </a:buClr>
-              <a:buSzPct val="70000"/>
-            </a:pPr>
-            <a:r>
-              <a:rPr lang="it-IT" sz="3199" b="1" noProof="1">
-                <a:latin typeface="Consolas" panose="020B0609020204030204" pitchFamily="49" charset="0"/>
-              </a:rPr>
-              <a:t>StringString</a:t>
-            </a:r>
-          </a:p>
-        </p:txBody>
-      </p:sp>
-      <p:sp>
-        <p:nvSpPr>
-          <p:cNvPr id="10" name="Right Arrow 9">
-            <a:extLst>
-              <a:ext uri="{FF2B5EF4-FFF2-40B4-BE49-F238E27FC236}">
-                <a16:creationId xmlns:a16="http://schemas.microsoft.com/office/drawing/2014/main" id="{D634171F-5415-4C3C-B065-E7868E428F3A}"/>
-              </a:ext>
-            </a:extLst>
-          </p:cNvPr>
-          <p:cNvSpPr/>
-          <p:nvPr/>
-        </p:nvSpPr>
-        <p:spPr>
-          <a:xfrm flipV="1">
-            <a:off x="4791318" y="4294740"/>
-            <a:ext cx="496215" cy="385646"/>
-          </a:xfrm>
-          <a:prstGeom prst="rightArrow">
-            <a:avLst/>
-          </a:prstGeom>
-          <a:solidFill>
-            <a:schemeClr val="dk2">
-              <a:alpha val="80000"/>
-            </a:schemeClr>
-          </a:solidFill>
-          <a:ln w="19050">
-            <a:solidFill>
-              <a:schemeClr val="tx1">
-                <a:lumMod val="75000"/>
-                <a:alpha val="80000"/>
-              </a:schemeClr>
-            </a:solidFill>
-          </a:ln>
-          <a:effectLst/>
-        </p:spPr>
-        <p:style>
-          <a:lnRef idx="2">
-            <a:schemeClr val="accent1">
-              <a:shade val="50000"/>
-            </a:schemeClr>
-          </a:lnRef>
-          <a:fillRef idx="1001">
-            <a:schemeClr val="dk2"/>
-          </a:fillRef>
-          <a:effectRef idx="0">
-            <a:schemeClr val="accent1"/>
-          </a:effectRef>
-          <a:fontRef idx="minor">
-            <a:schemeClr val="lt1"/>
-          </a:fontRef>
-        </p:style>
-        <p:txBody>
-          <a:bodyPr rot="0" spcFirstLastPara="0" vertOverflow="overflow" horzOverflow="overflow" vert="horz" wrap="square" lIns="91416" tIns="45708" rIns="91416" bIns="45708" numCol="1" spcCol="0" rtlCol="0" fromWordArt="0" anchor="ctr" anchorCtr="0" forceAA="0" compatLnSpc="1">
-            <a:prstTxWarp prst="textNoShape">
-              <a:avLst/>
-            </a:prstTxWarp>
-            <a:noAutofit/>
-          </a:bodyPr>
-          <a:lstStyle/>
-          <a:p>
-            <a:pPr algn="ctr"/>
-            <a:endParaRPr lang="en-US" sz="2799" b="1">
-              <a:solidFill>
-                <a:srgbClr val="FFFFFF"/>
-              </a:solidFill>
-              <a:effectLst>
-                <a:outerShdw blurRad="38100" dist="38100" dir="2700000" algn="tl">
-                  <a:srgbClr val="000000">
-                    <a:alpha val="43137"/>
-                  </a:srgbClr>
-                </a:outerShdw>
-              </a:effectLst>
-            </a:endParaRPr>
-          </a:p>
-        </p:txBody>
-      </p:sp>
-      <p:sp>
-        <p:nvSpPr>
-          <p:cNvPr id="13" name="Slide Number">
-            <a:extLst>
-              <a:ext uri="{FF2B5EF4-FFF2-40B4-BE49-F238E27FC236}">
-                <a16:creationId xmlns:a16="http://schemas.microsoft.com/office/drawing/2014/main" id="{B76EF317-04D5-432B-85BB-938DA25D11F2}"/>
-              </a:ext>
-            </a:extLst>
-          </p:cNvPr>
-          <p:cNvSpPr>
-            <a:spLocks noGrp="1"/>
-          </p:cNvSpPr>
-          <p:nvPr>
-            <p:ph type="sldNum" sz="quarter" idx="5"/>
-          </p:nvPr>
-        </p:nvSpPr>
-        <p:spPr>
-          <a:xfrm>
-            <a:off x="11753030" y="6507000"/>
-            <a:ext cx="367414" cy="297000"/>
-          </a:xfrm>
-          <a:prstGeom prst="rect">
-            <a:avLst/>
-          </a:prstGeom>
-        </p:spPr>
-        <p:txBody>
-          <a:bodyPr vert="horz" lIns="91440" tIns="45720" rIns="91440" bIns="45720" rtlCol="0" anchor="b"/>
-          <a:lstStyle>
-            <a:lvl1pPr algn="r">
-              <a:defRPr sz="1000"/>
-            </a:lvl1pPr>
-          </a:lstStyle>
-          <a:p>
-            <a:fld id="{2BF067CD-8E6B-4360-9AA8-C5DF2A48A6D1}" type="slidenum">
-              <a:rPr lang="en-US" noProof="0" smtClean="0"/>
-              <a:pPr/>
-              <a:t>22</a:t>
-            </a:fld>
-            <a:endParaRPr lang="en-US" noProof="0" dirty="0"/>
-          </a:p>
-        </p:txBody>
-      </p:sp>
-    </p:spTree>
-    <p:extLst>
-      <p:ext uri="{BB962C8B-B14F-4D97-AF65-F5344CB8AC3E}">
-        <p14:creationId xmlns:p14="http://schemas.microsoft.com/office/powerpoint/2010/main" val="1571126401"/>
-      </p:ext>
-    </p:extLst>
-  </p:cSld>
-  <p:clrMapOvr>
-    <a:masterClrMapping/>
-  </p:clrMapOvr>
-  <mc:AlternateContent xmlns:mc="http://schemas.openxmlformats.org/markup-compatibility/2006" xmlns:p14="http://schemas.microsoft.com/office/powerpoint/2010/main">
-    <mc:Choice Requires="p14">
-      <p:transition spd="slow" p14:dur="2000" advClick="0" advTm="5000"/>
-    </mc:Choice>
-    <mc:Fallback xmlns="">
-      <p:transition spd="slow" advClick="0" advTm="5000"/>
-    </mc:Fallback>
-  </mc:AlternateContent>
-  <p:timing>
-    <p:tnLst>
-      <p:par>
-        <p:cTn id="1" dur="indefinite" restart="never" nodeType="tmRoot">
-          <p:childTnLst>
-            <p:seq concurrent="1" nextAc="seek">
-              <p:cTn id="2" dur="indefinite" nodeType="mainSeq">
-                <p:childTnLst>
-                  <p:par>
-                    <p:cTn id="3" fill="hold">
-                      <p:stCondLst>
-                        <p:cond delay="indefinite"/>
-                      </p:stCondLst>
-                      <p:childTnLst>
-                        <p:par>
-                          <p:cTn id="4" fill="hold">
-                            <p:stCondLst>
-                              <p:cond delay="0"/>
-                            </p:stCondLst>
-                            <p:childTnLst>
-                              <p:par>
-                                <p:cTn id="5" presetID="1" presetClass="entr" presetSubtype="0" fill="hold" grpId="0" nodeType="clickEffect">
-                                  <p:stCondLst>
-                                    <p:cond delay="0"/>
-                                  </p:stCondLst>
-                                  <p:childTnLst>
-                                    <p:set>
-                                      <p:cBhvr>
-                                        <p:cTn id="6" dur="1" fill="hold">
-                                          <p:stCondLst>
-                                            <p:cond delay="0"/>
-                                          </p:stCondLst>
-                                        </p:cTn>
-                                        <p:tgtEl>
-                                          <p:spTgt spid="5"/>
-                                        </p:tgtEl>
-                                        <p:attrNameLst>
-                                          <p:attrName>style.visibility</p:attrName>
-                                        </p:attrNameLst>
-                                      </p:cBhvr>
-                                      <p:to>
-                                        <p:strVal val="visible"/>
-                                      </p:to>
-                                    </p:set>
-                                  </p:childTnLst>
-                                </p:cTn>
-                              </p:par>
-                              <p:par>
-                                <p:cTn id="7" presetID="1" presetClass="entr" presetSubtype="0" fill="hold" grpId="0" nodeType="withEffect">
-                                  <p:stCondLst>
-                                    <p:cond delay="0"/>
-                                  </p:stCondLst>
-                                  <p:childTnLst>
-                                    <p:set>
-                                      <p:cBhvr>
-                                        <p:cTn id="8" dur="1" fill="hold">
-                                          <p:stCondLst>
-                                            <p:cond delay="0"/>
-                                          </p:stCondLst>
-                                        </p:cTn>
-                                        <p:tgtEl>
-                                          <p:spTgt spid="6"/>
-                                        </p:tgtEl>
-                                        <p:attrNameLst>
-                                          <p:attrName>style.visibility</p:attrName>
-                                        </p:attrNameLst>
-                                      </p:cBhvr>
-                                      <p:to>
-                                        <p:strVal val="visible"/>
-                                      </p:to>
-                                    </p:set>
-                                  </p:childTnLst>
-                                </p:cTn>
-                              </p:par>
-                              <p:par>
-                                <p:cTn id="9" presetID="1" presetClass="entr" presetSubtype="0" fill="hold" grpId="0" nodeType="withEffect">
-                                  <p:stCondLst>
-                                    <p:cond delay="0"/>
-                                  </p:stCondLst>
-                                  <p:childTnLst>
-                                    <p:set>
-                                      <p:cBhvr>
-                                        <p:cTn id="10" dur="1" fill="hold">
-                                          <p:stCondLst>
-                                            <p:cond delay="0"/>
-                                          </p:stCondLst>
-                                        </p:cTn>
-                                        <p:tgtEl>
-                                          <p:spTgt spid="7"/>
-                                        </p:tgtEl>
-                                        <p:attrNameLst>
-                                          <p:attrName>style.visibility</p:attrName>
-                                        </p:attrNameLst>
-                                      </p:cBhvr>
-                                      <p:to>
-                                        <p:strVal val="visible"/>
-                                      </p:to>
-                                    </p:set>
-                                  </p:childTnLst>
-                                </p:cTn>
-                              </p:par>
-                              <p:par>
-                                <p:cTn id="11" presetID="1" presetClass="entr" presetSubtype="0" fill="hold" grpId="0" nodeType="withEffect">
-                                  <p:stCondLst>
-                                    <p:cond delay="0"/>
-                                  </p:stCondLst>
-                                  <p:childTnLst>
-                                    <p:set>
-                                      <p:cBhvr>
-                                        <p:cTn id="12" dur="1" fill="hold">
-                                          <p:stCondLst>
-                                            <p:cond delay="0"/>
-                                          </p:stCondLst>
-                                        </p:cTn>
-                                        <p:tgtEl>
-                                          <p:spTgt spid="8"/>
-                                        </p:tgtEl>
-                                        <p:attrNameLst>
-                                          <p:attrName>style.visibility</p:attrName>
-                                        </p:attrNameLst>
-                                      </p:cBhvr>
-                                      <p:to>
-                                        <p:strVal val="visible"/>
-                                      </p:to>
-                                    </p:set>
-                                  </p:childTnLst>
-                                </p:cTn>
-                              </p:par>
-                              <p:par>
-                                <p:cTn id="13" presetID="1" presetClass="entr" presetSubtype="0" fill="hold" grpId="0" nodeType="withEffect">
-                                  <p:stCondLst>
-                                    <p:cond delay="0"/>
-                                  </p:stCondLst>
-                                  <p:childTnLst>
-                                    <p:set>
-                                      <p:cBhvr>
-                                        <p:cTn id="14" dur="1" fill="hold">
-                                          <p:stCondLst>
-                                            <p:cond delay="0"/>
-                                          </p:stCondLst>
-                                        </p:cTn>
-                                        <p:tgtEl>
-                                          <p:spTgt spid="9"/>
-                                        </p:tgtEl>
-                                        <p:attrNameLst>
-                                          <p:attrName>style.visibility</p:attrName>
-                                        </p:attrNameLst>
-                                      </p:cBhvr>
-                                      <p:to>
-                                        <p:strVal val="visible"/>
-                                      </p:to>
-                                    </p:set>
-                                  </p:childTnLst>
-                                </p:cTn>
-                              </p:par>
-                              <p:par>
-                                <p:cTn id="15" presetID="1" presetClass="entr" presetSubtype="0" fill="hold" grpId="0" nodeType="withEffect">
-                                  <p:stCondLst>
-                                    <p:cond delay="0"/>
-                                  </p:stCondLst>
-                                  <p:childTnLst>
-                                    <p:set>
-                                      <p:cBhvr>
-                                        <p:cTn id="16" dur="1" fill="hold">
-                                          <p:stCondLst>
-                                            <p:cond delay="0"/>
-                                          </p:stCondLst>
-                                        </p:cTn>
-                                        <p:tgtEl>
-                                          <p:spTgt spid="10"/>
-                                        </p:tgtEl>
-                                        <p:attrNameLst>
-                                          <p:attrName>style.visibility</p:attrName>
-                                        </p:attrNameLst>
-                                      </p:cBhvr>
-                                      <p:to>
-                                        <p:strVal val="visible"/>
-                                      </p:to>
-                                    </p:set>
-                                  </p:childTnLst>
-                                </p:cTn>
-                              </p:par>
-                            </p:childTnLst>
-                          </p:cTn>
-                        </p:par>
-                      </p:childTnLst>
-                    </p:cTn>
-                  </p:par>
-                </p:childTnLst>
-              </p:cTn>
-              <p:prevCondLst>
-                <p:cond evt="onPrev" delay="0">
-                  <p:tgtEl>
-                    <p:sldTgt/>
-                  </p:tgtEl>
-                </p:cond>
-              </p:prevCondLst>
-              <p:nextCondLst>
-                <p:cond evt="onNext" delay="0">
-                  <p:tgtEl>
-                    <p:sldTgt/>
-                  </p:tgtEl>
-                </p:cond>
-              </p:nextCondLst>
-            </p:seq>
-          </p:childTnLst>
-        </p:cTn>
-      </p:par>
-    </p:tnLst>
-    <p:bldLst>
-      <p:bldP spid="5" grpId="0" animBg="1"/>
-      <p:bldP spid="6" grpId="0" animBg="1"/>
-      <p:bldP spid="7" grpId="0" animBg="1"/>
-      <p:bldP spid="8" grpId="0" animBg="1"/>
-      <p:bldP spid="9" grpId="0" animBg="1"/>
-      <p:bldP spid="10" grpId="0" animBg="1"/>
-    </p:bldLst>
-  </p:timing>
-</p:sld>
-</file>
-
-<file path=ppt/slides/slide23.xml><?xml version="1.0" encoding="utf-8"?>
-<p:sld xmlns:a="http://schemas.openxmlformats.org/drawingml/2006/main" xmlns:r="http://schemas.openxmlformats.org/officeDocument/2006/relationships" xmlns:p="http://schemas.openxmlformats.org/presentationml/2006/main">
-  <p:cSld>
-    <p:spTree>
-      <p:nvGrpSpPr>
-        <p:cNvPr id="1" name=""/>
-        <p:cNvGrpSpPr/>
-        <p:nvPr/>
-      </p:nvGrpSpPr>
-      <p:grpSpPr>
-        <a:xfrm>
-          <a:off x="0" y="0"/>
-          <a:ext cx="0" cy="0"/>
-          <a:chOff x="0" y="0"/>
-          <a:chExt cx="0" cy="0"/>
-        </a:xfrm>
-      </p:grpSpPr>
-      <p:sp>
-        <p:nvSpPr>
-          <p:cNvPr id="4" name="Title 3"/>
-          <p:cNvSpPr>
-            <a:spLocks noGrp="1"/>
-          </p:cNvSpPr>
-          <p:nvPr>
-            <p:ph type="title"/>
-          </p:nvPr>
-        </p:nvSpPr>
-        <p:spPr/>
-        <p:txBody>
-          <a:bodyPr/>
-          <a:lstStyle/>
-          <a:p>
-            <a:r>
-              <a:rPr lang="bg-BG" dirty="0"/>
-              <a:t>Решение</a:t>
-            </a:r>
-            <a:r>
-              <a:rPr lang="en-GB" dirty="0"/>
-              <a:t>: </a:t>
-            </a:r>
-            <a:r>
-              <a:rPr lang="bg-BG" dirty="0"/>
-              <a:t>Повторение на стринг </a:t>
-            </a:r>
-            <a:r>
-              <a:rPr lang="en-GB" dirty="0"/>
-              <a:t>(1)</a:t>
-            </a:r>
-            <a:endParaRPr lang="bg-BG" dirty="0"/>
-          </a:p>
-        </p:txBody>
-      </p:sp>
-      <p:sp>
-        <p:nvSpPr>
-          <p:cNvPr id="7" name="TextBox 6">
-            <a:extLst>
-              <a:ext uri="{FF2B5EF4-FFF2-40B4-BE49-F238E27FC236}">
-                <a16:creationId xmlns:a16="http://schemas.microsoft.com/office/drawing/2014/main" id="{54FFBC3C-9A6F-457B-A21C-0A77B5AC06D9}"/>
-              </a:ext>
-            </a:extLst>
-          </p:cNvPr>
-          <p:cNvSpPr txBox="1"/>
-          <p:nvPr/>
-        </p:nvSpPr>
-        <p:spPr>
-          <a:xfrm>
-            <a:off x="801479" y="6320033"/>
-            <a:ext cx="10589042" cy="400006"/>
-          </a:xfrm>
-          <a:prstGeom prst="rect">
-            <a:avLst/>
-          </a:prstGeom>
-          <a:noFill/>
-        </p:spPr>
-        <p:txBody>
-          <a:bodyPr wrap="square" rtlCol="0">
-            <a:spAutoFit/>
-          </a:bodyPr>
-          <a:lstStyle/>
-          <a:p>
-            <a:pPr algn="ctr"/>
-            <a:r>
-              <a:rPr lang="bg-BG" sz="1999" dirty="0"/>
-              <a:t>Проверете решението си тук</a:t>
-            </a:r>
-            <a:r>
-              <a:rPr lang="en-US" sz="1999" dirty="0"/>
-              <a:t>: </a:t>
-            </a:r>
-            <a:r>
-              <a:rPr lang="en-US" sz="1999" dirty="0">
-                <a:hlinkClick r:id="rId2"/>
-              </a:rPr>
-              <a:t>https://judge.softuni.bg/Contests/Practice/Index/3160#5</a:t>
-            </a:r>
-            <a:endParaRPr lang="en-US" sz="1999" dirty="0"/>
-          </a:p>
-        </p:txBody>
-      </p:sp>
-      <p:sp>
-        <p:nvSpPr>
-          <p:cNvPr id="10" name="Text Placeholder 2">
-            <a:extLst>
-              <a:ext uri="{FF2B5EF4-FFF2-40B4-BE49-F238E27FC236}">
-                <a16:creationId xmlns:a16="http://schemas.microsoft.com/office/drawing/2014/main" id="{585B5E1B-06A5-47E0-B361-4A7AF3FB1079}"/>
-              </a:ext>
-            </a:extLst>
-          </p:cNvPr>
-          <p:cNvSpPr txBox="1">
-            <a:spLocks/>
-          </p:cNvSpPr>
-          <p:nvPr/>
-        </p:nvSpPr>
-        <p:spPr>
-          <a:xfrm>
-            <a:off x="677863" y="1700808"/>
-            <a:ext cx="10836275" cy="4095000"/>
-          </a:xfrm>
-          <a:prstGeom prst="rect">
-            <a:avLst/>
-          </a:prstGeom>
-          <a:solidFill>
-            <a:srgbClr val="F4F5F7">
-              <a:lumMod val="75000"/>
-              <a:alpha val="15000"/>
-            </a:srgbClr>
-          </a:solidFill>
-          <a:ln w="12700">
-            <a:solidFill>
-              <a:srgbClr val="234465">
-                <a:lumMod val="50000"/>
-              </a:srgbClr>
-            </a:solidFill>
-          </a:ln>
-        </p:spPr>
-        <p:txBody>
-          <a:bodyPr vert="horz" wrap="square" lIns="144000" tIns="108000" rIns="144000" bIns="108000" rtlCol="0">
-            <a:spAutoFit/>
-          </a:bodyPr>
-          <a:lstStyle>
-            <a:lvl1pPr marL="360363" indent="-360363" algn="l" defTabSz="1218438" rtl="0" eaLnBrk="1" latinLnBrk="0" hangingPunct="1">
-              <a:lnSpc>
-                <a:spcPct val="110000"/>
-              </a:lnSpc>
-              <a:spcBef>
-                <a:spcPts val="0"/>
-              </a:spcBef>
-              <a:spcAft>
-                <a:spcPts val="0"/>
-              </a:spcAft>
-              <a:buFont typeface="Wingdings" panose="05000000000000000000" pitchFamily="2" charset="2"/>
-              <a:buNone/>
-              <a:defRPr lang="en-US" sz="2800" b="1" kern="1200" smtClean="0">
-                <a:solidFill>
-                  <a:schemeClr val="tx1"/>
-                </a:solidFill>
-                <a:latin typeface="Consolas" pitchFamily="49" charset="0"/>
-                <a:ea typeface="+mn-ea"/>
-                <a:cs typeface="+mn-cs"/>
-              </a:defRPr>
-            </a:lvl1pPr>
-            <a:lvl2pPr marL="803275" indent="-360363" algn="l" defTabSz="1218438" rtl="0" eaLnBrk="1" latinLnBrk="0" hangingPunct="1">
-              <a:lnSpc>
-                <a:spcPct val="105000"/>
-              </a:lnSpc>
-              <a:spcBef>
-                <a:spcPts val="600"/>
-              </a:spcBef>
-              <a:spcAft>
-                <a:spcPts val="600"/>
-              </a:spcAft>
-              <a:buFont typeface="Wingdings" panose="05000000000000000000" pitchFamily="2" charset="2"/>
-              <a:buChar char="§"/>
-              <a:defRPr lang="en-US" sz="3198" kern="1200" smtClean="0">
-                <a:solidFill>
-                  <a:schemeClr val="tx1"/>
-                </a:solidFill>
-                <a:latin typeface="+mn-lt"/>
-                <a:ea typeface="+mn-ea"/>
-                <a:cs typeface="+mn-cs"/>
-              </a:defRPr>
-            </a:lvl2pPr>
-            <a:lvl3pPr marL="1255713" indent="-360363" algn="l" defTabSz="1218438" rtl="0" eaLnBrk="1" latinLnBrk="0" hangingPunct="1">
-              <a:lnSpc>
-                <a:spcPct val="105000"/>
-              </a:lnSpc>
-              <a:spcBef>
-                <a:spcPts val="600"/>
-              </a:spcBef>
-              <a:spcAft>
-                <a:spcPts val="600"/>
-              </a:spcAft>
-              <a:buFont typeface="Wingdings" panose="05000000000000000000" pitchFamily="2" charset="2"/>
-              <a:buChar char="§"/>
-              <a:defRPr lang="en-US" sz="2998" kern="1200" smtClean="0">
-                <a:solidFill>
-                  <a:schemeClr val="tx1"/>
-                </a:solidFill>
-                <a:latin typeface="+mn-lt"/>
-                <a:ea typeface="+mn-ea"/>
-                <a:cs typeface="+mn-cs"/>
-              </a:defRPr>
-            </a:lvl3pPr>
-            <a:lvl4pPr marL="1700213" indent="-352425" algn="l" defTabSz="1218438" rtl="0" eaLnBrk="1" latinLnBrk="0" hangingPunct="1">
-              <a:lnSpc>
-                <a:spcPct val="105000"/>
-              </a:lnSpc>
-              <a:spcBef>
-                <a:spcPts val="600"/>
-              </a:spcBef>
-              <a:spcAft>
-                <a:spcPts val="600"/>
-              </a:spcAft>
-              <a:buFont typeface="Wingdings" panose="05000000000000000000" pitchFamily="2" charset="2"/>
-              <a:buChar char="§"/>
-              <a:defRPr lang="en-US" sz="2798" kern="1200" smtClean="0">
-                <a:solidFill>
-                  <a:schemeClr val="tx1"/>
-                </a:solidFill>
-                <a:latin typeface="+mn-lt"/>
-                <a:ea typeface="+mn-ea"/>
-                <a:cs typeface="+mn-cs"/>
-              </a:defRPr>
-            </a:lvl4pPr>
-            <a:lvl5pPr marL="2058988" indent="-266700" algn="l" defTabSz="1218438" rtl="0" eaLnBrk="1" latinLnBrk="0" hangingPunct="1">
-              <a:lnSpc>
-                <a:spcPct val="105000"/>
-              </a:lnSpc>
-              <a:spcBef>
-                <a:spcPts val="600"/>
-              </a:spcBef>
-              <a:spcAft>
-                <a:spcPts val="600"/>
-              </a:spcAft>
-              <a:buFont typeface="Wingdings" panose="05000000000000000000" pitchFamily="2" charset="2"/>
-              <a:buChar char="§"/>
-              <a:defRPr lang="en-US" sz="2598" kern="1200">
-                <a:solidFill>
-                  <a:schemeClr val="tx1"/>
-                </a:solidFill>
-                <a:latin typeface="+mn-lt"/>
-                <a:ea typeface="+mn-ea"/>
-                <a:cs typeface="+mn-cs"/>
-              </a:defRPr>
-            </a:lvl5pPr>
-            <a:lvl6pPr marL="3350704" indent="-304610" algn="l" defTabSz="1218438" rtl="0" eaLnBrk="1" latinLnBrk="1" hangingPunct="1">
-              <a:spcBef>
-                <a:spcPct val="20000"/>
-              </a:spcBef>
-              <a:buFont typeface="Arial" pitchFamily="34" charset="0"/>
-              <a:buChar char="•"/>
-              <a:defRPr sz="2665" kern="1200">
-                <a:solidFill>
-                  <a:schemeClr val="tx1"/>
-                </a:solidFill>
-                <a:latin typeface="+mn-lt"/>
-                <a:ea typeface="+mn-ea"/>
-                <a:cs typeface="+mn-cs"/>
-              </a:defRPr>
-            </a:lvl6pPr>
-            <a:lvl7pPr marL="3959924" indent="-304610" algn="l" defTabSz="1218438" rtl="0" eaLnBrk="1" latinLnBrk="1" hangingPunct="1">
-              <a:spcBef>
-                <a:spcPct val="20000"/>
-              </a:spcBef>
-              <a:buFont typeface="Arial" pitchFamily="34" charset="0"/>
-              <a:buChar char="•"/>
-              <a:defRPr sz="2665" kern="1200">
-                <a:solidFill>
-                  <a:schemeClr val="tx1"/>
-                </a:solidFill>
-                <a:latin typeface="+mn-lt"/>
-                <a:ea typeface="+mn-ea"/>
-                <a:cs typeface="+mn-cs"/>
-              </a:defRPr>
-            </a:lvl7pPr>
-            <a:lvl8pPr marL="4569143" indent="-304610" algn="l" defTabSz="1218438" rtl="0" eaLnBrk="1" latinLnBrk="1" hangingPunct="1">
-              <a:spcBef>
-                <a:spcPct val="20000"/>
-              </a:spcBef>
-              <a:buFont typeface="Arial" pitchFamily="34" charset="0"/>
-              <a:buChar char="•"/>
-              <a:defRPr sz="2665" kern="1200">
-                <a:solidFill>
-                  <a:schemeClr val="tx1"/>
-                </a:solidFill>
-                <a:latin typeface="+mn-lt"/>
-                <a:ea typeface="+mn-ea"/>
-                <a:cs typeface="+mn-cs"/>
-              </a:defRPr>
-            </a:lvl8pPr>
-            <a:lvl9pPr marL="5178362" indent="-304610" algn="l" defTabSz="1218438" rtl="0" eaLnBrk="1" latinLnBrk="1" hangingPunct="1">
-              <a:spcBef>
-                <a:spcPct val="20000"/>
-              </a:spcBef>
-              <a:buFont typeface="Arial" pitchFamily="34" charset="0"/>
-              <a:buChar char="•"/>
-              <a:defRPr sz="2665" kern="1200">
-                <a:solidFill>
-                  <a:schemeClr val="tx1"/>
-                </a:solidFill>
-                <a:latin typeface="+mn-lt"/>
-                <a:ea typeface="+mn-ea"/>
-                <a:cs typeface="+mn-cs"/>
-              </a:defRPr>
-            </a:lvl9pPr>
-          </a:lstStyle>
-          <a:p>
-            <a:pPr>
-              <a:defRPr/>
-            </a:pPr>
-            <a:r>
-              <a:rPr lang="en-GB" noProof="1"/>
-              <a:t>static void Main()</a:t>
-            </a:r>
-          </a:p>
-          <a:p>
-            <a:pPr>
-              <a:defRPr/>
-            </a:pPr>
-            <a:r>
-              <a:rPr lang="en-GB" noProof="1"/>
-              <a:t>{</a:t>
-            </a:r>
-          </a:p>
-          <a:p>
-            <a:pPr>
-              <a:defRPr/>
-            </a:pPr>
-            <a:r>
-              <a:rPr lang="en-GB" noProof="1"/>
-              <a:t>  string inputStr = Console.ReadLine();</a:t>
-            </a:r>
-          </a:p>
-          <a:p>
-            <a:pPr>
-              <a:defRPr/>
-            </a:pPr>
-            <a:r>
-              <a:rPr lang="en-GB" noProof="1"/>
-              <a:t>  int count = int.Parse(Console.ReadLine());</a:t>
-            </a:r>
-          </a:p>
-          <a:p>
-            <a:pPr>
-              <a:defRPr/>
-            </a:pPr>
-            <a:endParaRPr lang="en-GB" noProof="1"/>
-          </a:p>
-          <a:p>
-            <a:pPr>
-              <a:defRPr/>
-            </a:pPr>
-            <a:r>
-              <a:rPr lang="en-GB" noProof="1"/>
-              <a:t>  string result = </a:t>
-            </a:r>
-            <a:r>
-              <a:rPr lang="en-GB" noProof="1">
-                <a:solidFill>
-                  <a:srgbClr val="FFA000"/>
-                </a:solidFill>
-              </a:rPr>
-              <a:t>RepeatString</a:t>
-            </a:r>
-            <a:r>
-              <a:rPr lang="en-GB" noProof="1"/>
-              <a:t>(inputStr, count);</a:t>
-            </a:r>
-          </a:p>
-          <a:p>
-            <a:pPr>
-              <a:defRPr/>
-            </a:pPr>
-            <a:r>
-              <a:rPr lang="en-GB" noProof="1"/>
-              <a:t>  Console.WriteLine(result);</a:t>
-            </a:r>
-          </a:p>
-          <a:p>
-            <a:pPr>
-              <a:defRPr/>
-            </a:pPr>
-            <a:r>
-              <a:rPr lang="en-GB" noProof="1"/>
-              <a:t>}</a:t>
-            </a:r>
-          </a:p>
-        </p:txBody>
-      </p:sp>
-      <p:sp>
-        <p:nvSpPr>
-          <p:cNvPr id="6" name="Slide Number">
-            <a:extLst>
-              <a:ext uri="{FF2B5EF4-FFF2-40B4-BE49-F238E27FC236}">
-                <a16:creationId xmlns:a16="http://schemas.microsoft.com/office/drawing/2014/main" id="{AB1C2359-1366-4CA2-AFD6-B7BF3709DD40}"/>
-              </a:ext>
-            </a:extLst>
-          </p:cNvPr>
-          <p:cNvSpPr>
-            <a:spLocks noGrp="1"/>
-          </p:cNvSpPr>
-          <p:nvPr>
-            <p:ph type="sldNum" sz="quarter" idx="5"/>
-          </p:nvPr>
-        </p:nvSpPr>
-        <p:spPr>
-          <a:xfrm>
-            <a:off x="11753030" y="6507000"/>
-            <a:ext cx="367414" cy="297000"/>
-          </a:xfrm>
-          <a:prstGeom prst="rect">
-            <a:avLst/>
-          </a:prstGeom>
-        </p:spPr>
-        <p:txBody>
-          <a:bodyPr vert="horz" lIns="91440" tIns="45720" rIns="91440" bIns="45720" rtlCol="0" anchor="b"/>
-          <a:lstStyle>
-            <a:lvl1pPr algn="r">
-              <a:defRPr sz="1000"/>
-            </a:lvl1pPr>
-          </a:lstStyle>
-          <a:p>
-            <a:fld id="{2BF067CD-8E6B-4360-9AA8-C5DF2A48A6D1}" type="slidenum">
-              <a:rPr lang="en-US" noProof="0" smtClean="0"/>
-              <a:pPr/>
-              <a:t>23</a:t>
-            </a:fld>
-            <a:endParaRPr lang="en-US" noProof="0" dirty="0"/>
-          </a:p>
-        </p:txBody>
-      </p:sp>
-    </p:spTree>
-    <p:extLst>
-      <p:ext uri="{BB962C8B-B14F-4D97-AF65-F5344CB8AC3E}">
-        <p14:creationId xmlns:p14="http://schemas.microsoft.com/office/powerpoint/2010/main" val="1100028734"/>
-      </p:ext>
-    </p:extLst>
-  </p:cSld>
-  <p:clrMapOvr>
-    <a:masterClrMapping/>
-  </p:clrMapOvr>
-  <mc:AlternateContent xmlns:mc="http://schemas.openxmlformats.org/markup-compatibility/2006" xmlns:p14="http://schemas.microsoft.com/office/powerpoint/2010/main">
-    <mc:Choice Requires="p14">
-      <p:transition spd="slow" p14:dur="2000" advClick="0" advTm="5000"/>
-    </mc:Choice>
-    <mc:Fallback xmlns="">
-      <p:transition spd="slow" advClick="0" advTm="5000"/>
-    </mc:Fallback>
-  </mc:AlternateContent>
-  <p:timing>
-    <p:tnLst>
-      <p:par>
-        <p:cTn id="1" dur="indefinite" restart="never" nodeType="tmRoot">
-          <p:childTnLst>
-            <p:seq concurrent="1" nextAc="seek">
-              <p:cTn id="2" dur="indefinite" nodeType="mainSeq">
-                <p:childTnLst>
-                  <p:par>
-                    <p:cTn id="3" fill="hold">
-                      <p:stCondLst>
-                        <p:cond delay="indefinite"/>
-                      </p:stCondLst>
-                      <p:childTnLst>
-                        <p:par>
-                          <p:cTn id="4" fill="hold">
-                            <p:stCondLst>
-                              <p:cond delay="0"/>
-                            </p:stCondLst>
-                            <p:childTnLst>
-                              <p:par>
-                                <p:cTn id="5" presetID="1" presetClass="entr" presetSubtype="0" fill="hold" nodeType="clickEffect">
-                                  <p:stCondLst>
-                                    <p:cond delay="0"/>
-                                  </p:stCondLst>
-                                  <p:childTnLst>
-                                    <p:set>
-                                      <p:cBhvr>
-                                        <p:cTn id="6" dur="1" fill="hold">
-                                          <p:stCondLst>
-                                            <p:cond delay="0"/>
-                                          </p:stCondLst>
-                                        </p:cTn>
-                                        <p:tgtEl>
-                                          <p:spTgt spid="10">
-                                            <p:txEl>
-                                              <p:pRg st="2" end="2"/>
-                                            </p:txEl>
-                                          </p:spTgt>
-                                        </p:tgtEl>
-                                        <p:attrNameLst>
-                                          <p:attrName>style.visibility</p:attrName>
-                                        </p:attrNameLst>
-                                      </p:cBhvr>
-                                      <p:to>
-                                        <p:strVal val="visible"/>
-                                      </p:to>
-                                    </p:set>
-                                  </p:childTnLst>
-                                </p:cTn>
-                              </p:par>
-                              <p:par>
-                                <p:cTn id="7" presetID="1" presetClass="entr" presetSubtype="0" fill="hold" nodeType="withEffect">
-                                  <p:stCondLst>
-                                    <p:cond delay="0"/>
-                                  </p:stCondLst>
-                                  <p:childTnLst>
-                                    <p:set>
-                                      <p:cBhvr>
-                                        <p:cTn id="8" dur="1" fill="hold">
-                                          <p:stCondLst>
-                                            <p:cond delay="0"/>
-                                          </p:stCondLst>
-                                        </p:cTn>
-                                        <p:tgtEl>
-                                          <p:spTgt spid="10">
-                                            <p:txEl>
-                                              <p:pRg st="3" end="3"/>
-                                            </p:txEl>
-                                          </p:spTgt>
-                                        </p:tgtEl>
-                                        <p:attrNameLst>
-                                          <p:attrName>style.visibility</p:attrName>
-                                        </p:attrNameLst>
-                                      </p:cBhvr>
-                                      <p:to>
-                                        <p:strVal val="visible"/>
-                                      </p:to>
-                                    </p:set>
-                                  </p:childTnLst>
-                                </p:cTn>
-                              </p:par>
-                            </p:childTnLst>
-                          </p:cTn>
-                        </p:par>
-                      </p:childTnLst>
-                    </p:cTn>
-                  </p:par>
-                  <p:par>
-                    <p:cTn id="9" fill="hold">
-                      <p:stCondLst>
-                        <p:cond delay="indefinite"/>
-                      </p:stCondLst>
-                      <p:childTnLst>
-                        <p:par>
-                          <p:cTn id="10" fill="hold">
-                            <p:stCondLst>
-                              <p:cond delay="0"/>
-                            </p:stCondLst>
-                            <p:childTnLst>
-                              <p:par>
-                                <p:cTn id="11" presetID="1" presetClass="entr" presetSubtype="0" fill="hold" nodeType="clickEffect">
-                                  <p:stCondLst>
-                                    <p:cond delay="0"/>
-                                  </p:stCondLst>
-                                  <p:childTnLst>
-                                    <p:set>
-                                      <p:cBhvr>
-                                        <p:cTn id="12" dur="1" fill="hold">
-                                          <p:stCondLst>
-                                            <p:cond delay="0"/>
-                                          </p:stCondLst>
-                                        </p:cTn>
-                                        <p:tgtEl>
-                                          <p:spTgt spid="10">
-                                            <p:txEl>
-                                              <p:pRg st="5" end="5"/>
-                                            </p:txEl>
-                                          </p:spTgt>
-                                        </p:tgtEl>
-                                        <p:attrNameLst>
-                                          <p:attrName>style.visibility</p:attrName>
-                                        </p:attrNameLst>
-                                      </p:cBhvr>
-                                      <p:to>
-                                        <p:strVal val="visible"/>
-                                      </p:to>
-                                    </p:set>
-                                  </p:childTnLst>
-                                </p:cTn>
-                              </p:par>
-                            </p:childTnLst>
-                          </p:cTn>
-                        </p:par>
-                      </p:childTnLst>
-                    </p:cTn>
-                  </p:par>
-                  <p:par>
-                    <p:cTn id="13" fill="hold">
-                      <p:stCondLst>
-                        <p:cond delay="indefinite"/>
-                      </p:stCondLst>
-                      <p:childTnLst>
-                        <p:par>
-                          <p:cTn id="14" fill="hold">
-                            <p:stCondLst>
-                              <p:cond delay="0"/>
-                            </p:stCondLst>
-                            <p:childTnLst>
-                              <p:par>
-                                <p:cTn id="15" presetID="1" presetClass="entr" presetSubtype="0" fill="hold" nodeType="clickEffect">
-                                  <p:stCondLst>
-                                    <p:cond delay="0"/>
-                                  </p:stCondLst>
-                                  <p:childTnLst>
-                                    <p:set>
-                                      <p:cBhvr>
-                                        <p:cTn id="16" dur="1" fill="hold">
-                                          <p:stCondLst>
-                                            <p:cond delay="0"/>
-                                          </p:stCondLst>
-                                        </p:cTn>
-                                        <p:tgtEl>
-                                          <p:spTgt spid="10">
-                                            <p:txEl>
-                                              <p:pRg st="6" end="6"/>
-                                            </p:txEl>
-                                          </p:spTgt>
-                                        </p:tgtEl>
-                                        <p:attrNameLst>
-                                          <p:attrName>style.visibility</p:attrName>
-                                        </p:attrNameLst>
-                                      </p:cBhvr>
-                                      <p:to>
-                                        <p:strVal val="visible"/>
-                                      </p:to>
-                                    </p:set>
-                                  </p:childTnLst>
-                                </p:cTn>
-                              </p:par>
-                            </p:childTnLst>
-                          </p:cTn>
-                        </p:par>
-                      </p:childTnLst>
-                    </p:cTn>
-                  </p:par>
-                </p:childTnLst>
-              </p:cTn>
-              <p:prevCondLst>
-                <p:cond evt="onPrev" delay="0">
-                  <p:tgtEl>
-                    <p:sldTgt/>
-                  </p:tgtEl>
-                </p:cond>
-              </p:prevCondLst>
-              <p:nextCondLst>
-                <p:cond evt="onNext" delay="0">
-                  <p:tgtEl>
-                    <p:sldTgt/>
-                  </p:tgtEl>
-                </p:cond>
-              </p:nextCondLst>
-            </p:seq>
-          </p:childTnLst>
-        </p:cTn>
-      </p:par>
-    </p:tnLst>
-  </p:timing>
-</p:sld>
-</file>
-
-<file path=ppt/slides/slide24.xml><?xml version="1.0" encoding="utf-8"?>
-<p:sld xmlns:a="http://schemas.openxmlformats.org/drawingml/2006/main" xmlns:r="http://schemas.openxmlformats.org/officeDocument/2006/relationships" xmlns:p="http://schemas.openxmlformats.org/presentationml/2006/main">
-  <p:cSld>
-    <p:spTree>
-      <p:nvGrpSpPr>
-        <p:cNvPr id="1" name=""/>
-        <p:cNvGrpSpPr/>
-        <p:nvPr/>
-      </p:nvGrpSpPr>
-      <p:grpSpPr>
-        <a:xfrm>
-          <a:off x="0" y="0"/>
-          <a:ext cx="0" cy="0"/>
-          <a:chOff x="0" y="0"/>
-          <a:chExt cx="0" cy="0"/>
-        </a:xfrm>
-      </p:grpSpPr>
-      <p:sp>
-        <p:nvSpPr>
-          <p:cNvPr id="5" name="Title 4"/>
-          <p:cNvSpPr>
-            <a:spLocks noGrp="1"/>
-          </p:cNvSpPr>
-          <p:nvPr>
-            <p:ph type="title"/>
-          </p:nvPr>
-        </p:nvSpPr>
-        <p:spPr/>
-        <p:txBody>
-          <a:bodyPr/>
-          <a:lstStyle/>
-          <a:p>
-            <a:r>
-              <a:rPr lang="bg-BG" dirty="0"/>
-              <a:t>Решение</a:t>
-            </a:r>
-            <a:r>
-              <a:rPr lang="en-GB" dirty="0"/>
-              <a:t>: </a:t>
-            </a:r>
-            <a:r>
-              <a:rPr lang="bg-BG" dirty="0"/>
-              <a:t>Повторение на стринг </a:t>
-            </a:r>
-            <a:r>
-              <a:rPr lang="en-GB" dirty="0"/>
-              <a:t>(2)</a:t>
-            </a:r>
-            <a:endParaRPr lang="bg-BG" dirty="0"/>
-          </a:p>
-        </p:txBody>
-      </p:sp>
-      <p:sp>
-        <p:nvSpPr>
-          <p:cNvPr id="9" name="TextBox 8">
-            <a:extLst>
-              <a:ext uri="{FF2B5EF4-FFF2-40B4-BE49-F238E27FC236}">
-                <a16:creationId xmlns:a16="http://schemas.microsoft.com/office/drawing/2014/main" id="{B9A719A5-3E09-4063-AEF5-D2A315964F31}"/>
-              </a:ext>
-            </a:extLst>
-          </p:cNvPr>
-          <p:cNvSpPr txBox="1"/>
-          <p:nvPr/>
-        </p:nvSpPr>
-        <p:spPr>
-          <a:xfrm>
-            <a:off x="801479" y="6320033"/>
-            <a:ext cx="10589042" cy="400006"/>
-          </a:xfrm>
-          <a:prstGeom prst="rect">
-            <a:avLst/>
-          </a:prstGeom>
-          <a:noFill/>
-        </p:spPr>
-        <p:txBody>
-          <a:bodyPr wrap="square" rtlCol="0">
-            <a:spAutoFit/>
-          </a:bodyPr>
-          <a:lstStyle/>
-          <a:p>
-            <a:pPr algn="ctr"/>
-            <a:r>
-              <a:rPr lang="bg-BG" sz="1999" dirty="0"/>
-              <a:t>Проверете решението си тук</a:t>
-            </a:r>
-            <a:r>
-              <a:rPr lang="en-US" sz="1999" dirty="0"/>
-              <a:t>: </a:t>
-            </a:r>
-            <a:r>
-              <a:rPr lang="en-US" sz="1999" dirty="0">
-                <a:hlinkClick r:id="rId2"/>
-              </a:rPr>
-              <a:t>https://judge.softuni.bg/Contests/Practice/Index/3160#5</a:t>
-            </a:r>
-            <a:endParaRPr lang="en-US" sz="1999" dirty="0"/>
-          </a:p>
-        </p:txBody>
-      </p:sp>
-      <p:sp>
-        <p:nvSpPr>
-          <p:cNvPr id="11" name="Text Placeholder 6">
-            <a:extLst>
-              <a:ext uri="{FF2B5EF4-FFF2-40B4-BE49-F238E27FC236}">
-                <a16:creationId xmlns:a16="http://schemas.microsoft.com/office/drawing/2014/main" id="{E3F306FB-1E41-48BD-88B6-0426865A8EDA}"/>
-              </a:ext>
-            </a:extLst>
-          </p:cNvPr>
-          <p:cNvSpPr txBox="1">
-            <a:spLocks/>
-          </p:cNvSpPr>
-          <p:nvPr/>
-        </p:nvSpPr>
-        <p:spPr>
-          <a:xfrm>
-            <a:off x="384306" y="1491548"/>
-            <a:ext cx="11423388" cy="4457732"/>
-          </a:xfrm>
-          <a:prstGeom prst="rect">
-            <a:avLst/>
-          </a:prstGeom>
-          <a:solidFill>
-            <a:srgbClr val="F4F5F7">
-              <a:lumMod val="75000"/>
-              <a:alpha val="15000"/>
-            </a:srgbClr>
-          </a:solidFill>
-          <a:ln w="12700">
-            <a:solidFill>
-              <a:srgbClr val="234465">
-                <a:lumMod val="50000"/>
-              </a:srgbClr>
-            </a:solidFill>
-          </a:ln>
-        </p:spPr>
-        <p:txBody>
-          <a:bodyPr vert="horz" wrap="square" lIns="144000" tIns="108000" rIns="144000" bIns="108000" rtlCol="0">
-            <a:spAutoFit/>
-          </a:bodyPr>
-          <a:lstStyle>
-            <a:lvl1pPr marL="360363" indent="-360363" algn="l" defTabSz="1218438" rtl="0" eaLnBrk="1" latinLnBrk="0" hangingPunct="1">
-              <a:lnSpc>
-                <a:spcPct val="110000"/>
-              </a:lnSpc>
-              <a:spcBef>
-                <a:spcPts val="0"/>
-              </a:spcBef>
-              <a:spcAft>
-                <a:spcPts val="0"/>
-              </a:spcAft>
-              <a:buFont typeface="Wingdings" panose="05000000000000000000" pitchFamily="2" charset="2"/>
-              <a:buNone/>
-              <a:defRPr lang="en-US" sz="2800" b="1" kern="1200" smtClean="0">
-                <a:solidFill>
-                  <a:schemeClr val="tx1"/>
-                </a:solidFill>
-                <a:latin typeface="Consolas" pitchFamily="49" charset="0"/>
-                <a:ea typeface="+mn-ea"/>
-                <a:cs typeface="+mn-cs"/>
-              </a:defRPr>
-            </a:lvl1pPr>
-            <a:lvl2pPr marL="803275" indent="-360363" algn="l" defTabSz="1218438" rtl="0" eaLnBrk="1" latinLnBrk="0" hangingPunct="1">
-              <a:lnSpc>
-                <a:spcPct val="105000"/>
-              </a:lnSpc>
-              <a:spcBef>
-                <a:spcPts val="600"/>
-              </a:spcBef>
-              <a:spcAft>
-                <a:spcPts val="600"/>
-              </a:spcAft>
-              <a:buFont typeface="Wingdings" panose="05000000000000000000" pitchFamily="2" charset="2"/>
-              <a:buChar char="§"/>
-              <a:defRPr lang="en-US" sz="3198" kern="1200" smtClean="0">
-                <a:solidFill>
-                  <a:schemeClr val="tx1"/>
-                </a:solidFill>
-                <a:latin typeface="+mn-lt"/>
-                <a:ea typeface="+mn-ea"/>
-                <a:cs typeface="+mn-cs"/>
-              </a:defRPr>
-            </a:lvl2pPr>
-            <a:lvl3pPr marL="1255713" indent="-360363" algn="l" defTabSz="1218438" rtl="0" eaLnBrk="1" latinLnBrk="0" hangingPunct="1">
-              <a:lnSpc>
-                <a:spcPct val="105000"/>
-              </a:lnSpc>
-              <a:spcBef>
-                <a:spcPts val="600"/>
-              </a:spcBef>
-              <a:spcAft>
-                <a:spcPts val="600"/>
-              </a:spcAft>
-              <a:buFont typeface="Wingdings" panose="05000000000000000000" pitchFamily="2" charset="2"/>
-              <a:buChar char="§"/>
-              <a:defRPr lang="en-US" sz="2998" kern="1200" smtClean="0">
-                <a:solidFill>
-                  <a:schemeClr val="tx1"/>
-                </a:solidFill>
-                <a:latin typeface="+mn-lt"/>
-                <a:ea typeface="+mn-ea"/>
-                <a:cs typeface="+mn-cs"/>
-              </a:defRPr>
-            </a:lvl3pPr>
-            <a:lvl4pPr marL="1700213" indent="-352425" algn="l" defTabSz="1218438" rtl="0" eaLnBrk="1" latinLnBrk="0" hangingPunct="1">
-              <a:lnSpc>
-                <a:spcPct val="105000"/>
-              </a:lnSpc>
-              <a:spcBef>
-                <a:spcPts val="600"/>
-              </a:spcBef>
-              <a:spcAft>
-                <a:spcPts val="600"/>
-              </a:spcAft>
-              <a:buFont typeface="Wingdings" panose="05000000000000000000" pitchFamily="2" charset="2"/>
-              <a:buChar char="§"/>
-              <a:defRPr lang="en-US" sz="2798" kern="1200" smtClean="0">
-                <a:solidFill>
-                  <a:schemeClr val="tx1"/>
-                </a:solidFill>
-                <a:latin typeface="+mn-lt"/>
-                <a:ea typeface="+mn-ea"/>
-                <a:cs typeface="+mn-cs"/>
-              </a:defRPr>
-            </a:lvl4pPr>
-            <a:lvl5pPr marL="2058988" indent="-266700" algn="l" defTabSz="1218438" rtl="0" eaLnBrk="1" latinLnBrk="0" hangingPunct="1">
-              <a:lnSpc>
-                <a:spcPct val="105000"/>
-              </a:lnSpc>
-              <a:spcBef>
-                <a:spcPts val="600"/>
-              </a:spcBef>
-              <a:spcAft>
-                <a:spcPts val="600"/>
-              </a:spcAft>
-              <a:buFont typeface="Wingdings" panose="05000000000000000000" pitchFamily="2" charset="2"/>
-              <a:buChar char="§"/>
-              <a:defRPr lang="en-US" sz="2598" kern="1200">
-                <a:solidFill>
-                  <a:schemeClr val="tx1"/>
-                </a:solidFill>
-                <a:latin typeface="+mn-lt"/>
-                <a:ea typeface="+mn-ea"/>
-                <a:cs typeface="+mn-cs"/>
-              </a:defRPr>
-            </a:lvl5pPr>
-            <a:lvl6pPr marL="3350704" indent="-304610" algn="l" defTabSz="1218438" rtl="0" eaLnBrk="1" latinLnBrk="1" hangingPunct="1">
-              <a:spcBef>
-                <a:spcPct val="20000"/>
-              </a:spcBef>
-              <a:buFont typeface="Arial" pitchFamily="34" charset="0"/>
-              <a:buChar char="•"/>
-              <a:defRPr sz="2665" kern="1200">
-                <a:solidFill>
-                  <a:schemeClr val="tx1"/>
-                </a:solidFill>
-                <a:latin typeface="+mn-lt"/>
-                <a:ea typeface="+mn-ea"/>
-                <a:cs typeface="+mn-cs"/>
-              </a:defRPr>
-            </a:lvl6pPr>
-            <a:lvl7pPr marL="3959924" indent="-304610" algn="l" defTabSz="1218438" rtl="0" eaLnBrk="1" latinLnBrk="1" hangingPunct="1">
-              <a:spcBef>
-                <a:spcPct val="20000"/>
-              </a:spcBef>
-              <a:buFont typeface="Arial" pitchFamily="34" charset="0"/>
-              <a:buChar char="•"/>
-              <a:defRPr sz="2665" kern="1200">
-                <a:solidFill>
-                  <a:schemeClr val="tx1"/>
-                </a:solidFill>
-                <a:latin typeface="+mn-lt"/>
-                <a:ea typeface="+mn-ea"/>
-                <a:cs typeface="+mn-cs"/>
-              </a:defRPr>
-            </a:lvl7pPr>
-            <a:lvl8pPr marL="4569143" indent="-304610" algn="l" defTabSz="1218438" rtl="0" eaLnBrk="1" latinLnBrk="1" hangingPunct="1">
-              <a:spcBef>
-                <a:spcPct val="20000"/>
-              </a:spcBef>
-              <a:buFont typeface="Arial" pitchFamily="34" charset="0"/>
-              <a:buChar char="•"/>
-              <a:defRPr sz="2665" kern="1200">
-                <a:solidFill>
-                  <a:schemeClr val="tx1"/>
-                </a:solidFill>
-                <a:latin typeface="+mn-lt"/>
-                <a:ea typeface="+mn-ea"/>
-                <a:cs typeface="+mn-cs"/>
-              </a:defRPr>
-            </a:lvl8pPr>
-            <a:lvl9pPr marL="5178362" indent="-304610" algn="l" defTabSz="1218438" rtl="0" eaLnBrk="1" latinLnBrk="1" hangingPunct="1">
-              <a:spcBef>
-                <a:spcPct val="20000"/>
-              </a:spcBef>
-              <a:buFont typeface="Arial" pitchFamily="34" charset="0"/>
-              <a:buChar char="•"/>
-              <a:defRPr sz="2665" kern="1200">
-                <a:solidFill>
-                  <a:schemeClr val="tx1"/>
-                </a:solidFill>
-                <a:latin typeface="+mn-lt"/>
-                <a:ea typeface="+mn-ea"/>
-                <a:cs typeface="+mn-cs"/>
-              </a:defRPr>
-            </a:lvl9pPr>
-          </a:lstStyle>
-          <a:p>
-            <a:pPr>
-              <a:defRPr/>
-            </a:pPr>
-            <a:r>
-              <a:rPr lang="en-GB" noProof="1"/>
-              <a:t>private static </a:t>
-            </a:r>
-            <a:r>
-              <a:rPr lang="en-GB" noProof="1">
-                <a:solidFill>
-                  <a:srgbClr val="FFA000"/>
-                </a:solidFill>
-              </a:rPr>
-              <a:t>string</a:t>
-            </a:r>
-            <a:r>
-              <a:rPr lang="en-GB" noProof="1">
-                <a:solidFill>
-                  <a:srgbClr val="234465"/>
-                </a:solidFill>
-              </a:rPr>
-              <a:t> </a:t>
-            </a:r>
-            <a:r>
-              <a:rPr lang="en-GB" noProof="1">
-                <a:solidFill>
-                  <a:srgbClr val="FFA000"/>
-                </a:solidFill>
-              </a:rPr>
-              <a:t>RepeatString</a:t>
-            </a:r>
-            <a:r>
-              <a:rPr lang="en-GB" noProof="1"/>
-              <a:t>(string str,</a:t>
-            </a:r>
-            <a:r>
-              <a:rPr lang="en-GB" noProof="1">
-                <a:latin typeface="Calibri"/>
-              </a:rPr>
-              <a:t> </a:t>
-            </a:r>
-            <a:r>
-              <a:rPr lang="en-GB" noProof="1"/>
-              <a:t>int count)</a:t>
-            </a:r>
-          </a:p>
-          <a:p>
-            <a:pPr>
-              <a:defRPr/>
-            </a:pPr>
-            <a:r>
-              <a:rPr lang="en-GB" noProof="1"/>
-              <a:t>{</a:t>
-            </a:r>
-          </a:p>
-          <a:p>
-            <a:pPr>
-              <a:defRPr/>
-            </a:pPr>
-            <a:r>
-              <a:rPr lang="en-GB" noProof="1"/>
-              <a:t>  StringBuilder result = new StringBuilder();</a:t>
-            </a:r>
-          </a:p>
-          <a:p>
-            <a:pPr>
-              <a:defRPr/>
-            </a:pPr>
-            <a:r>
-              <a:rPr lang="en-GB" noProof="1"/>
-              <a:t>  for (int i = 0; i &lt; count; i++)</a:t>
-            </a:r>
-          </a:p>
-          <a:p>
-            <a:pPr>
-              <a:defRPr/>
-            </a:pPr>
-            <a:r>
-              <a:rPr lang="en-GB" noProof="1"/>
-              <a:t>  {</a:t>
-            </a:r>
-          </a:p>
-          <a:p>
-            <a:pPr>
-              <a:defRPr/>
-            </a:pPr>
-            <a:r>
-              <a:rPr lang="en-GB" noProof="1"/>
-              <a:t>    result.Append(str);</a:t>
-            </a:r>
-          </a:p>
-          <a:p>
-            <a:pPr>
-              <a:defRPr/>
-            </a:pPr>
-            <a:r>
-              <a:rPr lang="en-GB" noProof="1"/>
-              <a:t>  }</a:t>
-            </a:r>
-          </a:p>
-          <a:p>
-            <a:pPr>
-              <a:defRPr/>
-            </a:pPr>
-            <a:r>
-              <a:rPr lang="en-GB" noProof="1">
-                <a:solidFill>
-                  <a:srgbClr val="234465"/>
-                </a:solidFill>
-              </a:rPr>
-              <a:t>  </a:t>
-            </a:r>
-            <a:r>
-              <a:rPr lang="en-GB" noProof="1">
-                <a:solidFill>
-                  <a:srgbClr val="FFA000"/>
-                </a:solidFill>
-              </a:rPr>
-              <a:t>return</a:t>
-            </a:r>
-            <a:r>
-              <a:rPr lang="en-GB" noProof="1">
-                <a:solidFill>
-                  <a:srgbClr val="234465"/>
-                </a:solidFill>
-              </a:rPr>
-              <a:t> </a:t>
-            </a:r>
-            <a:r>
-              <a:rPr lang="en-GB" noProof="1"/>
-              <a:t>result.ToString();</a:t>
-            </a:r>
-          </a:p>
-          <a:p>
-            <a:pPr>
-              <a:defRPr/>
-            </a:pPr>
-            <a:r>
-              <a:rPr lang="en-GB" noProof="1"/>
-              <a:t>}</a:t>
-            </a:r>
-          </a:p>
-        </p:txBody>
-      </p:sp>
-      <p:sp>
-        <p:nvSpPr>
-          <p:cNvPr id="6" name="Slide Number">
-            <a:extLst>
-              <a:ext uri="{FF2B5EF4-FFF2-40B4-BE49-F238E27FC236}">
-                <a16:creationId xmlns:a16="http://schemas.microsoft.com/office/drawing/2014/main" id="{3F48F810-77CE-448B-B116-B1BB7823967D}"/>
-              </a:ext>
-            </a:extLst>
-          </p:cNvPr>
-          <p:cNvSpPr>
-            <a:spLocks noGrp="1"/>
-          </p:cNvSpPr>
-          <p:nvPr>
-            <p:ph type="sldNum" sz="quarter" idx="5"/>
-          </p:nvPr>
-        </p:nvSpPr>
-        <p:spPr>
-          <a:xfrm>
-            <a:off x="11753030" y="6507000"/>
-            <a:ext cx="367414" cy="297000"/>
-          </a:xfrm>
-          <a:prstGeom prst="rect">
-            <a:avLst/>
-          </a:prstGeom>
-        </p:spPr>
-        <p:txBody>
-          <a:bodyPr vert="horz" lIns="91440" tIns="45720" rIns="91440" bIns="45720" rtlCol="0" anchor="b"/>
-          <a:lstStyle>
-            <a:lvl1pPr algn="r">
-              <a:defRPr sz="1000"/>
-            </a:lvl1pPr>
-          </a:lstStyle>
-          <a:p>
-            <a:fld id="{2BF067CD-8E6B-4360-9AA8-C5DF2A48A6D1}" type="slidenum">
-              <a:rPr lang="en-US" noProof="0" smtClean="0"/>
-              <a:pPr/>
-              <a:t>24</a:t>
-            </a:fld>
-            <a:endParaRPr lang="en-US" noProof="0" dirty="0"/>
-          </a:p>
-        </p:txBody>
-      </p:sp>
-    </p:spTree>
-    <p:extLst>
-      <p:ext uri="{BB962C8B-B14F-4D97-AF65-F5344CB8AC3E}">
-        <p14:creationId xmlns:p14="http://schemas.microsoft.com/office/powerpoint/2010/main" val="3127219394"/>
-      </p:ext>
-    </p:extLst>
-  </p:cSld>
-  <p:clrMapOvr>
-    <a:masterClrMapping/>
-  </p:clrMapOvr>
-  <mc:AlternateContent xmlns:mc="http://schemas.openxmlformats.org/markup-compatibility/2006" xmlns:p14="http://schemas.microsoft.com/office/powerpoint/2010/main">
-    <mc:Choice Requires="p14">
-      <p:transition spd="slow" p14:dur="2000" advClick="0" advTm="5000"/>
-    </mc:Choice>
-    <mc:Fallback xmlns="">
-      <p:transition spd="slow" advClick="0" advTm="5000"/>
-    </mc:Fallback>
-  </mc:AlternateContent>
-  <p:timing>
-    <p:tnLst>
-      <p:par>
-        <p:cTn id="1" dur="indefinite" restart="never" nodeType="tmRoot">
-          <p:childTnLst>
-            <p:seq concurrent="1" nextAc="seek">
-              <p:cTn id="2" dur="indefinite" nodeType="mainSeq">
-                <p:childTnLst>
-                  <p:par>
-                    <p:cTn id="3" fill="hold">
-                      <p:stCondLst>
-                        <p:cond delay="indefinite"/>
-                      </p:stCondLst>
-                      <p:childTnLst>
-                        <p:par>
-                          <p:cTn id="4" fill="hold">
-                            <p:stCondLst>
-                              <p:cond delay="0"/>
-                            </p:stCondLst>
-                            <p:childTnLst>
-                              <p:par>
-                                <p:cTn id="5" presetID="1" presetClass="entr" presetSubtype="0" fill="hold" nodeType="clickEffect">
-                                  <p:stCondLst>
-                                    <p:cond delay="0"/>
-                                  </p:stCondLst>
-                                  <p:childTnLst>
-                                    <p:set>
-                                      <p:cBhvr>
-                                        <p:cTn id="6" dur="1" fill="hold">
-                                          <p:stCondLst>
-                                            <p:cond delay="0"/>
-                                          </p:stCondLst>
-                                        </p:cTn>
-                                        <p:tgtEl>
-                                          <p:spTgt spid="11">
-                                            <p:txEl>
-                                              <p:pRg st="2" end="2"/>
-                                            </p:txEl>
-                                          </p:spTgt>
-                                        </p:tgtEl>
-                                        <p:attrNameLst>
-                                          <p:attrName>style.visibility</p:attrName>
-                                        </p:attrNameLst>
-                                      </p:cBhvr>
-                                      <p:to>
-                                        <p:strVal val="visible"/>
-                                      </p:to>
-                                    </p:set>
-                                  </p:childTnLst>
-                                </p:cTn>
-                              </p:par>
-                            </p:childTnLst>
-                          </p:cTn>
-                        </p:par>
-                      </p:childTnLst>
-                    </p:cTn>
-                  </p:par>
-                  <p:par>
-                    <p:cTn id="7" fill="hold">
-                      <p:stCondLst>
-                        <p:cond delay="indefinite"/>
-                      </p:stCondLst>
-                      <p:childTnLst>
-                        <p:par>
-                          <p:cTn id="8" fill="hold">
-                            <p:stCondLst>
-                              <p:cond delay="0"/>
-                            </p:stCondLst>
-                            <p:childTnLst>
-                              <p:par>
-                                <p:cTn id="9" presetID="1" presetClass="entr" presetSubtype="0" fill="hold" nodeType="clickEffect">
-                                  <p:stCondLst>
-                                    <p:cond delay="0"/>
-                                  </p:stCondLst>
-                                  <p:childTnLst>
-                                    <p:set>
-                                      <p:cBhvr>
-                                        <p:cTn id="10" dur="1" fill="hold">
-                                          <p:stCondLst>
-                                            <p:cond delay="0"/>
-                                          </p:stCondLst>
-                                        </p:cTn>
-                                        <p:tgtEl>
-                                          <p:spTgt spid="11">
-                                            <p:txEl>
-                                              <p:pRg st="3" end="3"/>
-                                            </p:txEl>
-                                          </p:spTgt>
-                                        </p:tgtEl>
-                                        <p:attrNameLst>
-                                          <p:attrName>style.visibility</p:attrName>
-                                        </p:attrNameLst>
-                                      </p:cBhvr>
-                                      <p:to>
-                                        <p:strVal val="visible"/>
-                                      </p:to>
-                                    </p:set>
-                                  </p:childTnLst>
-                                </p:cTn>
-                              </p:par>
-                            </p:childTnLst>
-                          </p:cTn>
-                        </p:par>
-                      </p:childTnLst>
-                    </p:cTn>
-                  </p:par>
-                  <p:par>
-                    <p:cTn id="11" fill="hold">
-                      <p:stCondLst>
-                        <p:cond delay="indefinite"/>
-                      </p:stCondLst>
-                      <p:childTnLst>
-                        <p:par>
-                          <p:cTn id="12" fill="hold">
-                            <p:stCondLst>
-                              <p:cond delay="0"/>
-                            </p:stCondLst>
-                            <p:childTnLst>
-                              <p:par>
-                                <p:cTn id="13" presetID="1" presetClass="entr" presetSubtype="0" fill="hold" nodeType="clickEffect">
-                                  <p:stCondLst>
-                                    <p:cond delay="0"/>
-                                  </p:stCondLst>
-                                  <p:childTnLst>
-                                    <p:set>
-                                      <p:cBhvr>
-                                        <p:cTn id="14" dur="1" fill="hold">
-                                          <p:stCondLst>
-                                            <p:cond delay="0"/>
-                                          </p:stCondLst>
-                                        </p:cTn>
-                                        <p:tgtEl>
-                                          <p:spTgt spid="11">
-                                            <p:txEl>
-                                              <p:pRg st="4" end="4"/>
-                                            </p:txEl>
-                                          </p:spTgt>
-                                        </p:tgtEl>
-                                        <p:attrNameLst>
-                                          <p:attrName>style.visibility</p:attrName>
-                                        </p:attrNameLst>
-                                      </p:cBhvr>
-                                      <p:to>
-                                        <p:strVal val="visible"/>
-                                      </p:to>
-                                    </p:set>
-                                  </p:childTnLst>
-                                </p:cTn>
-                              </p:par>
-                              <p:par>
-                                <p:cTn id="15" presetID="1" presetClass="entr" presetSubtype="0" fill="hold" nodeType="withEffect">
-                                  <p:stCondLst>
-                                    <p:cond delay="0"/>
-                                  </p:stCondLst>
-                                  <p:childTnLst>
-                                    <p:set>
-                                      <p:cBhvr>
-                                        <p:cTn id="16" dur="1" fill="hold">
-                                          <p:stCondLst>
-                                            <p:cond delay="0"/>
-                                          </p:stCondLst>
-                                        </p:cTn>
-                                        <p:tgtEl>
-                                          <p:spTgt spid="11">
-                                            <p:txEl>
-                                              <p:pRg st="5" end="5"/>
-                                            </p:txEl>
-                                          </p:spTgt>
-                                        </p:tgtEl>
-                                        <p:attrNameLst>
-                                          <p:attrName>style.visibility</p:attrName>
-                                        </p:attrNameLst>
-                                      </p:cBhvr>
-                                      <p:to>
-                                        <p:strVal val="visible"/>
-                                      </p:to>
-                                    </p:set>
-                                  </p:childTnLst>
-                                </p:cTn>
-                              </p:par>
-                              <p:par>
-                                <p:cTn id="17" presetID="1" presetClass="entr" presetSubtype="0" fill="hold" nodeType="withEffect">
-                                  <p:stCondLst>
-                                    <p:cond delay="0"/>
-                                  </p:stCondLst>
-                                  <p:childTnLst>
-                                    <p:set>
-                                      <p:cBhvr>
-                                        <p:cTn id="18" dur="1" fill="hold">
-                                          <p:stCondLst>
-                                            <p:cond delay="0"/>
-                                          </p:stCondLst>
-                                        </p:cTn>
-                                        <p:tgtEl>
-                                          <p:spTgt spid="11">
-                                            <p:txEl>
-                                              <p:pRg st="6" end="6"/>
-                                            </p:txEl>
-                                          </p:spTgt>
-                                        </p:tgtEl>
-                                        <p:attrNameLst>
-                                          <p:attrName>style.visibility</p:attrName>
-                                        </p:attrNameLst>
-                                      </p:cBhvr>
-                                      <p:to>
-                                        <p:strVal val="visible"/>
-                                      </p:to>
-                                    </p:set>
-                                  </p:childTnLst>
-                                </p:cTn>
-                              </p:par>
-                            </p:childTnLst>
-                          </p:cTn>
-                        </p:par>
-                      </p:childTnLst>
-                    </p:cTn>
-                  </p:par>
-                  <p:par>
-                    <p:cTn id="19" fill="hold">
-                      <p:stCondLst>
-                        <p:cond delay="indefinite"/>
-                      </p:stCondLst>
-                      <p:childTnLst>
-                        <p:par>
-                          <p:cTn id="20" fill="hold">
-                            <p:stCondLst>
-                              <p:cond delay="0"/>
-                            </p:stCondLst>
-                            <p:childTnLst>
-                              <p:par>
-                                <p:cTn id="21" presetID="1" presetClass="entr" presetSubtype="0" fill="hold" nodeType="clickEffect">
-                                  <p:stCondLst>
-                                    <p:cond delay="0"/>
-                                  </p:stCondLst>
-                                  <p:childTnLst>
-                                    <p:set>
-                                      <p:cBhvr>
-                                        <p:cTn id="22" dur="1" fill="hold">
-                                          <p:stCondLst>
-                                            <p:cond delay="0"/>
-                                          </p:stCondLst>
-                                        </p:cTn>
-                                        <p:tgtEl>
-                                          <p:spTgt spid="11">
-                                            <p:txEl>
-                                              <p:pRg st="7" end="7"/>
-                                            </p:txEl>
-                                          </p:spTgt>
-                                        </p:tgtEl>
-                                        <p:attrNameLst>
-                                          <p:attrName>style.visibility</p:attrName>
-                                        </p:attrNameLst>
-                                      </p:cBhvr>
-                                      <p:to>
-                                        <p:strVal val="visible"/>
-                                      </p:to>
-                                    </p:set>
-                                  </p:childTnLst>
-                                </p:cTn>
-                              </p:par>
-                            </p:childTnLst>
-                          </p:cTn>
-                        </p:par>
-                      </p:childTnLst>
-                    </p:cTn>
-                  </p:par>
-                </p:childTnLst>
-              </p:cTn>
-              <p:prevCondLst>
-                <p:cond evt="onPrev" delay="0">
-                  <p:tgtEl>
-                    <p:sldTgt/>
-                  </p:tgtEl>
-                </p:cond>
-              </p:prevCondLst>
-              <p:nextCondLst>
-                <p:cond evt="onNext" delay="0">
-                  <p:tgtEl>
-                    <p:sldTgt/>
-                  </p:tgtEl>
-                </p:cond>
-              </p:nextCondLst>
-            </p:seq>
-          </p:childTnLst>
-        </p:cTn>
-      </p:par>
-    </p:tnLst>
-  </p:timing>
-</p:sld>
-</file>
-
-<file path=ppt/slides/slide25.xml><?xml version="1.0" encoding="utf-8"?>
-<p:sld xmlns:a="http://schemas.openxmlformats.org/drawingml/2006/main" xmlns:r="http://schemas.openxmlformats.org/officeDocument/2006/relationships" xmlns:p="http://schemas.openxmlformats.org/presentationml/2006/main">
-  <p:cSld>
-    <p:spTree>
-      <p:nvGrpSpPr>
-        <p:cNvPr id="1" name=""/>
-        <p:cNvGrpSpPr/>
-        <p:nvPr/>
-      </p:nvGrpSpPr>
-      <p:grpSpPr>
-        <a:xfrm>
-          <a:off x="0" y="0"/>
-          <a:ext cx="0" cy="0"/>
-          <a:chOff x="0" y="0"/>
-          <a:chExt cx="0" cy="0"/>
-        </a:xfrm>
-      </p:grpSpPr>
       <p:grpSp>
         <p:nvGrpSpPr>
           <p:cNvPr id="2" name="Group 1"/>
@@ -25342,7 +22967,7 @@
 </p:sld>
 </file>
 
-<file path=ppt/slides/slide26.xml><?xml version="1.0" encoding="utf-8"?>
+<file path=ppt/slides/slide23.xml><?xml version="1.0" encoding="utf-8"?>
 <p:sld xmlns:a="http://schemas.openxmlformats.org/drawingml/2006/main" xmlns:r="http://schemas.openxmlformats.org/officeDocument/2006/relationships" xmlns:p="http://schemas.openxmlformats.org/presentationml/2006/main">
   <p:cSld>
     <p:spTree>
@@ -25885,7 +23510,7 @@
             <a:fld id="{2BF067CD-8E6B-4360-9AA8-C5DF2A48A6D1}" type="slidenum">
               <a:rPr lang="en-US" noProof="0" smtClean="0"/>
               <a:pPr/>
-              <a:t>26</a:t>
+              <a:t>23</a:t>
             </a:fld>
             <a:endParaRPr lang="en-US" noProof="0" dirty="0"/>
           </a:p>
@@ -26253,7 +23878,7 @@
 </p:sld>
 </file>
 
-<file path=ppt/slides/slide27.xml><?xml version="1.0" encoding="utf-8"?>
+<file path=ppt/slides/slide24.xml><?xml version="1.0" encoding="utf-8"?>
 <p:sld xmlns:a="http://schemas.openxmlformats.org/drawingml/2006/main" xmlns:r="http://schemas.openxmlformats.org/officeDocument/2006/relationships" xmlns:p="http://schemas.openxmlformats.org/presentationml/2006/main">
   <p:cSld>
     <p:spTree>
@@ -26387,7 +24012,7 @@
 </p:sld>
 </file>
 
-<file path=ppt/slides/slide28.xml><?xml version="1.0" encoding="utf-8"?>
+<file path=ppt/slides/slide25.xml><?xml version="1.0" encoding="utf-8"?>
 <p:sld xmlns:a="http://schemas.openxmlformats.org/drawingml/2006/main" xmlns:r="http://schemas.openxmlformats.org/officeDocument/2006/relationships" xmlns:p="http://schemas.openxmlformats.org/presentationml/2006/main">
   <p:cSld>
     <p:spTree>
@@ -27080,7 +24705,7 @@
             <a:fld id="{2BF067CD-8E6B-4360-9AA8-C5DF2A48A6D1}" type="slidenum">
               <a:rPr lang="en-US" smtClean="0"/>
               <a:pPr/>
-              <a:t>28</a:t>
+              <a:t>25</a:t>
             </a:fld>
             <a:endParaRPr lang="en-US" dirty="0"/>
           </a:p>
@@ -27414,7 +25039,7 @@
 </p:sld>
 </file>
 
-<file path=ppt/slides/slide29.xml><?xml version="1.0" encoding="utf-8"?>
+<file path=ppt/slides/slide26.xml><?xml version="1.0" encoding="utf-8"?>
 <p:sld xmlns:a="http://schemas.openxmlformats.org/drawingml/2006/main" xmlns:r="http://schemas.openxmlformats.org/officeDocument/2006/relationships" xmlns:p="http://schemas.openxmlformats.org/presentationml/2006/main">
   <p:cSld>
     <p:spTree>
@@ -27818,7 +25443,7 @@
             <a:fld id="{2BF067CD-8E6B-4360-9AA8-C5DF2A48A6D1}" type="slidenum">
               <a:rPr lang="en-US" smtClean="0"/>
               <a:pPr/>
-              <a:t>29</a:t>
+              <a:t>26</a:t>
             </a:fld>
             <a:endParaRPr lang="en-US" dirty="0"/>
           </a:p>
@@ -28304,97 +25929,7 @@
 </p:sld>
 </file>
 
-<file path=ppt/slides/slide3.xml><?xml version="1.0" encoding="utf-8"?>
-<p:sld xmlns:a="http://schemas.openxmlformats.org/drawingml/2006/main" xmlns:r="http://schemas.openxmlformats.org/officeDocument/2006/relationships" xmlns:p="http://schemas.openxmlformats.org/presentationml/2006/main">
-  <p:cSld>
-    <p:spTree>
-      <p:nvGrpSpPr>
-        <p:cNvPr id="1" name=""/>
-        <p:cNvGrpSpPr/>
-        <p:nvPr/>
-      </p:nvGrpSpPr>
-      <p:grpSpPr>
-        <a:xfrm>
-          <a:off x="0" y="0"/>
-          <a:ext cx="0" cy="0"/>
-          <a:chOff x="0" y="0"/>
-          <a:chExt cx="0" cy="0"/>
-        </a:xfrm>
-      </p:grpSpPr>
-      <p:sp>
-        <p:nvSpPr>
-          <p:cNvPr id="3" name="Заглавие 2">
-            <a:extLst>
-              <a:ext uri="{FF2B5EF4-FFF2-40B4-BE49-F238E27FC236}">
-                <a16:creationId xmlns:a16="http://schemas.microsoft.com/office/drawing/2014/main" id="{40FEC155-AFE6-4CAD-9AF6-AC97422739E4}"/>
-              </a:ext>
-            </a:extLst>
-          </p:cNvPr>
-          <p:cNvSpPr>
-            <a:spLocks noGrp="1"/>
-          </p:cNvSpPr>
-          <p:nvPr>
-            <p:ph type="title" sz="quarter" idx="10"/>
-          </p:nvPr>
-        </p:nvSpPr>
-        <p:spPr/>
-        <p:txBody>
-          <a:bodyPr/>
-          <a:lstStyle/>
-          <a:p>
-            <a:r>
-              <a:rPr lang="bg-BG" dirty="0"/>
-              <a:t>Какво е метод?</a:t>
-            </a:r>
-          </a:p>
-        </p:txBody>
-      </p:sp>
-      <p:pic>
-        <p:nvPicPr>
-          <p:cNvPr id="8" name="Picture 7"/>
-          <p:cNvPicPr>
-            <a:picLocks noChangeAspect="1"/>
-          </p:cNvPicPr>
-          <p:nvPr/>
-        </p:nvPicPr>
-        <p:blipFill>
-          <a:blip r:embed="rId3"/>
-          <a:stretch>
-            <a:fillRect/>
-          </a:stretch>
-        </p:blipFill>
-        <p:spPr>
-          <a:xfrm>
-            <a:off x="4843102" y="1524496"/>
-            <a:ext cx="2505799" cy="2296314"/>
-          </a:xfrm>
-          <a:prstGeom prst="rect">
-            <a:avLst/>
-          </a:prstGeom>
-        </p:spPr>
-      </p:pic>
-    </p:spTree>
-    <p:extLst>
-      <p:ext uri="{BB962C8B-B14F-4D97-AF65-F5344CB8AC3E}">
-        <p14:creationId xmlns:p14="http://schemas.microsoft.com/office/powerpoint/2010/main" val="3431890975"/>
-      </p:ext>
-    </p:extLst>
-  </p:cSld>
-  <p:clrMapOvr>
-    <a:masterClrMapping/>
-  </p:clrMapOvr>
-  <mc:AlternateContent xmlns:mc="http://schemas.openxmlformats.org/markup-compatibility/2006" xmlns:p14="http://schemas.microsoft.com/office/powerpoint/2010/main">
-    <mc:Choice Requires="p14">
-      <p:transition spd="slow" p14:dur="2000" advClick="0" advTm="5000"/>
-    </mc:Choice>
-    <mc:Fallback xmlns="">
-      <p:transition spd="slow" advClick="0" advTm="5000"/>
-    </mc:Fallback>
-  </mc:AlternateContent>
-</p:sld>
-</file>
-
-<file path=ppt/slides/slide30.xml><?xml version="1.0" encoding="utf-8"?>
+<file path=ppt/slides/slide27.xml><?xml version="1.0" encoding="utf-8"?>
 <p:sld xmlns:a="http://schemas.openxmlformats.org/drawingml/2006/main" xmlns:r="http://schemas.openxmlformats.org/officeDocument/2006/relationships" xmlns:p="http://schemas.openxmlformats.org/presentationml/2006/main">
   <p:cSld>
     <p:spTree>
@@ -29100,7 +26635,7 @@
             <a:fld id="{2BF067CD-8E6B-4360-9AA8-C5DF2A48A6D1}" type="slidenum">
               <a:rPr lang="en-US" noProof="0" smtClean="0"/>
               <a:pPr/>
-              <a:t>30</a:t>
+              <a:t>27</a:t>
             </a:fld>
             <a:endParaRPr lang="en-US" noProof="0" dirty="0"/>
           </a:p>
@@ -29355,7 +26890,7 @@
 </p:sld>
 </file>
 
-<file path=ppt/slides/slide31.xml><?xml version="1.0" encoding="utf-8"?>
+<file path=ppt/slides/slide28.xml><?xml version="1.0" encoding="utf-8"?>
 <p:sld xmlns:a="http://schemas.openxmlformats.org/drawingml/2006/main" xmlns:r="http://schemas.openxmlformats.org/officeDocument/2006/relationships" xmlns:p="http://schemas.openxmlformats.org/presentationml/2006/main">
   <p:cSld>
     <p:spTree>
@@ -30355,7 +27890,7 @@
             <a:fld id="{2BF067CD-8E6B-4360-9AA8-C5DF2A48A6D1}" type="slidenum">
               <a:rPr lang="en-US" noProof="0" smtClean="0"/>
               <a:pPr/>
-              <a:t>31</a:t>
+              <a:t>28</a:t>
             </a:fld>
             <a:endParaRPr lang="en-US" noProof="0" dirty="0"/>
           </a:p>
@@ -30552,7 +28087,7 @@
 </p:sld>
 </file>
 
-<file path=ppt/slides/slide32.xml><?xml version="1.0" encoding="utf-8"?>
+<file path=ppt/slides/slide29.xml><?xml version="1.0" encoding="utf-8"?>
 <p:sld xmlns:a="http://schemas.openxmlformats.org/drawingml/2006/main" xmlns:r="http://schemas.openxmlformats.org/officeDocument/2006/relationships" xmlns:p="http://schemas.openxmlformats.org/presentationml/2006/main">
   <p:cSld>
     <p:spTree>
@@ -31409,7 +28944,7 @@
             <a:fld id="{2BF067CD-8E6B-4360-9AA8-C5DF2A48A6D1}" type="slidenum">
               <a:rPr lang="en-US" noProof="0" smtClean="0"/>
               <a:pPr/>
-              <a:t>32</a:t>
+              <a:t>29</a:t>
             </a:fld>
             <a:endParaRPr lang="en-US" noProof="0" dirty="0"/>
           </a:p>
@@ -31662,7 +29197,97 @@
 </p:sld>
 </file>
 
-<file path=ppt/slides/slide33.xml><?xml version="1.0" encoding="utf-8"?>
+<file path=ppt/slides/slide3.xml><?xml version="1.0" encoding="utf-8"?>
+<p:sld xmlns:a="http://schemas.openxmlformats.org/drawingml/2006/main" xmlns:r="http://schemas.openxmlformats.org/officeDocument/2006/relationships" xmlns:p="http://schemas.openxmlformats.org/presentationml/2006/main">
+  <p:cSld>
+    <p:spTree>
+      <p:nvGrpSpPr>
+        <p:cNvPr id="1" name=""/>
+        <p:cNvGrpSpPr/>
+        <p:nvPr/>
+      </p:nvGrpSpPr>
+      <p:grpSpPr>
+        <a:xfrm>
+          <a:off x="0" y="0"/>
+          <a:ext cx="0" cy="0"/>
+          <a:chOff x="0" y="0"/>
+          <a:chExt cx="0" cy="0"/>
+        </a:xfrm>
+      </p:grpSpPr>
+      <p:sp>
+        <p:nvSpPr>
+          <p:cNvPr id="3" name="Заглавие 2">
+            <a:extLst>
+              <a:ext uri="{FF2B5EF4-FFF2-40B4-BE49-F238E27FC236}">
+                <a16:creationId xmlns:a16="http://schemas.microsoft.com/office/drawing/2014/main" id="{40FEC155-AFE6-4CAD-9AF6-AC97422739E4}"/>
+              </a:ext>
+            </a:extLst>
+          </p:cNvPr>
+          <p:cNvSpPr>
+            <a:spLocks noGrp="1"/>
+          </p:cNvSpPr>
+          <p:nvPr>
+            <p:ph type="title" sz="quarter" idx="10"/>
+          </p:nvPr>
+        </p:nvSpPr>
+        <p:spPr/>
+        <p:txBody>
+          <a:bodyPr/>
+          <a:lstStyle/>
+          <a:p>
+            <a:r>
+              <a:rPr lang="bg-BG" dirty="0"/>
+              <a:t>Какво е метод?</a:t>
+            </a:r>
+          </a:p>
+        </p:txBody>
+      </p:sp>
+      <p:pic>
+        <p:nvPicPr>
+          <p:cNvPr id="8" name="Picture 7"/>
+          <p:cNvPicPr>
+            <a:picLocks noChangeAspect="1"/>
+          </p:cNvPicPr>
+          <p:nvPr/>
+        </p:nvPicPr>
+        <p:blipFill>
+          <a:blip r:embed="rId3"/>
+          <a:stretch>
+            <a:fillRect/>
+          </a:stretch>
+        </p:blipFill>
+        <p:spPr>
+          <a:xfrm>
+            <a:off x="4843102" y="1524496"/>
+            <a:ext cx="2505799" cy="2296314"/>
+          </a:xfrm>
+          <a:prstGeom prst="rect">
+            <a:avLst/>
+          </a:prstGeom>
+        </p:spPr>
+      </p:pic>
+    </p:spTree>
+    <p:extLst>
+      <p:ext uri="{BB962C8B-B14F-4D97-AF65-F5344CB8AC3E}">
+        <p14:creationId xmlns:p14="http://schemas.microsoft.com/office/powerpoint/2010/main" val="3431890975"/>
+      </p:ext>
+    </p:extLst>
+  </p:cSld>
+  <p:clrMapOvr>
+    <a:masterClrMapping/>
+  </p:clrMapOvr>
+  <mc:AlternateContent xmlns:mc="http://schemas.openxmlformats.org/markup-compatibility/2006" xmlns:p14="http://schemas.microsoft.com/office/powerpoint/2010/main">
+    <mc:Choice Requires="p14">
+      <p:transition spd="slow" p14:dur="2000" advClick="0" advTm="5000"/>
+    </mc:Choice>
+    <mc:Fallback xmlns="">
+      <p:transition spd="slow" advClick="0" advTm="5000"/>
+    </mc:Fallback>
+  </mc:AlternateContent>
+</p:sld>
+</file>
+
+<file path=ppt/slides/slide30.xml><?xml version="1.0" encoding="utf-8"?>
 <p:sld xmlns:a="http://schemas.openxmlformats.org/drawingml/2006/main" xmlns:r="http://schemas.openxmlformats.org/officeDocument/2006/relationships" xmlns:p="http://schemas.openxmlformats.org/presentationml/2006/main">
   <p:cSld>
     <p:spTree>
@@ -31741,7 +29366,7 @@
 </p:sld>
 </file>
 
-<file path=ppt/slides/slide34.xml><?xml version="1.0" encoding="utf-8"?>
+<file path=ppt/slides/slide31.xml><?xml version="1.0" encoding="utf-8"?>
 <p:sld xmlns:a="http://schemas.openxmlformats.org/drawingml/2006/main" xmlns:r="http://schemas.openxmlformats.org/officeDocument/2006/relationships" xmlns:p="http://schemas.openxmlformats.org/presentationml/2006/main">
   <p:cSld>
     <p:spTree>
@@ -32005,7 +29630,7 @@
             <a:fld id="{2BF067CD-8E6B-4360-9AA8-C5DF2A48A6D1}" type="slidenum">
               <a:rPr lang="en-US" noProof="0" smtClean="0"/>
               <a:pPr/>
-              <a:t>34</a:t>
+              <a:t>31</a:t>
             </a:fld>
             <a:endParaRPr lang="en-US" noProof="0" dirty="0"/>
           </a:p>

</xml_diff>